<commit_message>
Finalized materials for W2S3, created extras folder, revised typos in W1S1 notebook and slides about backprop.
</commit_message>
<xml_diff>
--- a/W3/0. All/W3.pptx
+++ b/W3/0. All/W3.pptx
@@ -147,6 +147,60 @@
 <file path=ppt/changesInfos/changesInfo1.xml><?xml version="1.0" encoding="utf-8"?>
 <pc:chgInfo xmlns:a="http://schemas.openxmlformats.org/drawingml/2006/main" xmlns:r="http://schemas.openxmlformats.org/officeDocument/2006/relationships" xmlns:ac="http://schemas.microsoft.com/office/drawing/2013/main/command" xmlns:pc="http://schemas.microsoft.com/office/powerpoint/2013/main/command">
   <pc:docChgLst>
+    <pc:chgData name="Matthieu De Mari" userId="dfb708c9-d8dc-439f-9a3b-c772bf4a311c" providerId="ADAL" clId="{D2FDBEB2-E663-41FC-8A3C-AC79657DF6AB}"/>
+    <pc:docChg chg="modSld">
+      <pc:chgData name="Matthieu De Mari" userId="dfb708c9-d8dc-439f-9a3b-c772bf4a311c" providerId="ADAL" clId="{D2FDBEB2-E663-41FC-8A3C-AC79657DF6AB}" dt="2023-01-31T09:39:03.009" v="70" actId="20577"/>
+      <pc:docMkLst>
+        <pc:docMk/>
+      </pc:docMkLst>
+      <pc:sldChg chg="modSp mod">
+        <pc:chgData name="Matthieu De Mari" userId="dfb708c9-d8dc-439f-9a3b-c772bf4a311c" providerId="ADAL" clId="{D2FDBEB2-E663-41FC-8A3C-AC79657DF6AB}" dt="2023-01-31T09:38:27.909" v="1" actId="20577"/>
+        <pc:sldMkLst>
+          <pc:docMk/>
+          <pc:sldMk cId="3442501962" sldId="257"/>
+        </pc:sldMkLst>
+        <pc:spChg chg="mod">
+          <ac:chgData name="Matthieu De Mari" userId="dfb708c9-d8dc-439f-9a3b-c772bf4a311c" providerId="ADAL" clId="{D2FDBEB2-E663-41FC-8A3C-AC79657DF6AB}" dt="2023-01-31T09:38:27.909" v="1" actId="20577"/>
+          <ac:spMkLst>
+            <pc:docMk/>
+            <pc:sldMk cId="3442501962" sldId="257"/>
+            <ac:spMk id="2" creationId="{49D40417-A4D3-4CE8-96E7-708E2439AE7B}"/>
+          </ac:spMkLst>
+        </pc:spChg>
+      </pc:sldChg>
+      <pc:sldChg chg="modSp mod">
+        <pc:chgData name="Matthieu De Mari" userId="dfb708c9-d8dc-439f-9a3b-c772bf4a311c" providerId="ADAL" clId="{D2FDBEB2-E663-41FC-8A3C-AC79657DF6AB}" dt="2023-01-31T09:38:33.645" v="7" actId="20577"/>
+        <pc:sldMkLst>
+          <pc:docMk/>
+          <pc:sldMk cId="1036081419" sldId="346"/>
+        </pc:sldMkLst>
+        <pc:spChg chg="mod">
+          <ac:chgData name="Matthieu De Mari" userId="dfb708c9-d8dc-439f-9a3b-c772bf4a311c" providerId="ADAL" clId="{D2FDBEB2-E663-41FC-8A3C-AC79657DF6AB}" dt="2023-01-31T09:38:33.645" v="7" actId="20577"/>
+          <ac:spMkLst>
+            <pc:docMk/>
+            <pc:sldMk cId="1036081419" sldId="346"/>
+            <ac:spMk id="2" creationId="{11A08BA8-9DEC-4471-8590-434E8D8BB4A0}"/>
+          </ac:spMkLst>
+        </pc:spChg>
+      </pc:sldChg>
+      <pc:sldChg chg="modSp mod">
+        <pc:chgData name="Matthieu De Mari" userId="dfb708c9-d8dc-439f-9a3b-c772bf4a311c" providerId="ADAL" clId="{D2FDBEB2-E663-41FC-8A3C-AC79657DF6AB}" dt="2023-01-31T09:39:03.009" v="70" actId="20577"/>
+        <pc:sldMkLst>
+          <pc:docMk/>
+          <pc:sldMk cId="1040156172" sldId="377"/>
+        </pc:sldMkLst>
+        <pc:spChg chg="mod">
+          <ac:chgData name="Matthieu De Mari" userId="dfb708c9-d8dc-439f-9a3b-c772bf4a311c" providerId="ADAL" clId="{D2FDBEB2-E663-41FC-8A3C-AC79657DF6AB}" dt="2023-01-31T09:39:03.009" v="70" actId="20577"/>
+          <ac:spMkLst>
+            <pc:docMk/>
+            <pc:sldMk cId="1040156172" sldId="377"/>
+            <ac:spMk id="2" creationId="{080CEB46-CC16-4D19-8C2C-AEE9471D8168}"/>
+          </ac:spMkLst>
+        </pc:spChg>
+      </pc:sldChg>
+    </pc:docChg>
+  </pc:docChgLst>
+  <pc:docChgLst>
     <pc:chgData name="Matthieu De Mari" userId="dfb708c9-d8dc-439f-9a3b-c772bf4a311c" providerId="ADAL" clId="{8EE40018-26BD-4A7B-8D17-70AC8417C2D0}"/>
     <pc:docChg chg="undo custSel addSld delSld modSld addSection delSection modSection">
       <pc:chgData name="Matthieu De Mari" userId="dfb708c9-d8dc-439f-9a3b-c772bf4a311c" providerId="ADAL" clId="{8EE40018-26BD-4A7B-8D17-70AC8417C2D0}" dt="2022-11-16T06:55:05.435" v="67" actId="47"/>
@@ -1089,7 +1143,7 @@
           <a:p>
             <a:fld id="{61478373-EB31-4867-8CF0-FA31364748A5}" type="datetimeFigureOut">
               <a:rPr lang="en-GB" smtClean="0"/>
-              <a:t>16/11/2022</a:t>
+              <a:t>31/01/2023</a:t>
             </a:fld>
             <a:endParaRPr lang="en-GB"/>
           </a:p>
@@ -1506,7 +1560,7 @@
           <a:p>
             <a:fld id="{E85DF616-B21E-4EF6-A6A5-95E2FB3EB1A1}" type="datetimeFigureOut">
               <a:rPr lang="en-GB" smtClean="0"/>
-              <a:t>16/11/2022</a:t>
+              <a:t>31/01/2023</a:t>
             </a:fld>
             <a:endParaRPr lang="en-GB"/>
           </a:p>
@@ -1706,7 +1760,7 @@
           <a:p>
             <a:fld id="{E85DF616-B21E-4EF6-A6A5-95E2FB3EB1A1}" type="datetimeFigureOut">
               <a:rPr lang="en-GB" smtClean="0"/>
-              <a:t>16/11/2022</a:t>
+              <a:t>31/01/2023</a:t>
             </a:fld>
             <a:endParaRPr lang="en-GB"/>
           </a:p>
@@ -1916,7 +1970,7 @@
           <a:p>
             <a:fld id="{E85DF616-B21E-4EF6-A6A5-95E2FB3EB1A1}" type="datetimeFigureOut">
               <a:rPr lang="en-GB" smtClean="0"/>
-              <a:t>16/11/2022</a:t>
+              <a:t>31/01/2023</a:t>
             </a:fld>
             <a:endParaRPr lang="en-GB"/>
           </a:p>
@@ -2116,7 +2170,7 @@
           <a:p>
             <a:fld id="{E85DF616-B21E-4EF6-A6A5-95E2FB3EB1A1}" type="datetimeFigureOut">
               <a:rPr lang="en-GB" smtClean="0"/>
-              <a:t>16/11/2022</a:t>
+              <a:t>31/01/2023</a:t>
             </a:fld>
             <a:endParaRPr lang="en-GB"/>
           </a:p>
@@ -2392,7 +2446,7 @@
           <a:p>
             <a:fld id="{E85DF616-B21E-4EF6-A6A5-95E2FB3EB1A1}" type="datetimeFigureOut">
               <a:rPr lang="en-GB" smtClean="0"/>
-              <a:t>16/11/2022</a:t>
+              <a:t>31/01/2023</a:t>
             </a:fld>
             <a:endParaRPr lang="en-GB"/>
           </a:p>
@@ -2660,7 +2714,7 @@
           <a:p>
             <a:fld id="{E85DF616-B21E-4EF6-A6A5-95E2FB3EB1A1}" type="datetimeFigureOut">
               <a:rPr lang="en-GB" smtClean="0"/>
-              <a:t>16/11/2022</a:t>
+              <a:t>31/01/2023</a:t>
             </a:fld>
             <a:endParaRPr lang="en-GB"/>
           </a:p>
@@ -3075,7 +3129,7 @@
           <a:p>
             <a:fld id="{E85DF616-B21E-4EF6-A6A5-95E2FB3EB1A1}" type="datetimeFigureOut">
               <a:rPr lang="en-GB" smtClean="0"/>
-              <a:t>16/11/2022</a:t>
+              <a:t>31/01/2023</a:t>
             </a:fld>
             <a:endParaRPr lang="en-GB"/>
           </a:p>
@@ -3217,7 +3271,7 @@
           <a:p>
             <a:fld id="{E85DF616-B21E-4EF6-A6A5-95E2FB3EB1A1}" type="datetimeFigureOut">
               <a:rPr lang="en-GB" smtClean="0"/>
-              <a:t>16/11/2022</a:t>
+              <a:t>31/01/2023</a:t>
             </a:fld>
             <a:endParaRPr lang="en-GB"/>
           </a:p>
@@ -3330,7 +3384,7 @@
           <a:p>
             <a:fld id="{E85DF616-B21E-4EF6-A6A5-95E2FB3EB1A1}" type="datetimeFigureOut">
               <a:rPr lang="en-GB" smtClean="0"/>
-              <a:t>16/11/2022</a:t>
+              <a:t>31/01/2023</a:t>
             </a:fld>
             <a:endParaRPr lang="en-GB"/>
           </a:p>
@@ -3643,7 +3697,7 @@
           <a:p>
             <a:fld id="{E85DF616-B21E-4EF6-A6A5-95E2FB3EB1A1}" type="datetimeFigureOut">
               <a:rPr lang="en-GB" smtClean="0"/>
-              <a:t>16/11/2022</a:t>
+              <a:t>31/01/2023</a:t>
             </a:fld>
             <a:endParaRPr lang="en-GB"/>
           </a:p>
@@ -3932,7 +3986,7 @@
           <a:p>
             <a:fld id="{E85DF616-B21E-4EF6-A6A5-95E2FB3EB1A1}" type="datetimeFigureOut">
               <a:rPr lang="en-GB" smtClean="0"/>
-              <a:t>16/11/2022</a:t>
+              <a:t>31/01/2023</a:t>
             </a:fld>
             <a:endParaRPr lang="en-GB"/>
           </a:p>
@@ -4175,7 +4229,7 @@
           <a:p>
             <a:fld id="{E85DF616-B21E-4EF6-A6A5-95E2FB3EB1A1}" type="datetimeFigureOut">
               <a:rPr lang="en-GB" smtClean="0"/>
-              <a:t>16/11/2022</a:t>
+              <a:t>31/01/2023</a:t>
             </a:fld>
             <a:endParaRPr lang="en-GB"/>
           </a:p>
@@ -4730,7 +4784,15 @@
             </a:br>
             <a:r>
               <a:rPr lang="en-US" dirty="0"/>
-              <a:t>W1-S1 Introduction</a:t>
+              <a:t>W3-S1 Introduction to Deep Learning using the </a:t>
+            </a:r>
+            <a:r>
+              <a:rPr lang="en-US" dirty="0" err="1"/>
+              <a:t>PyTorch</a:t>
+            </a:r>
+            <a:r>
+              <a:rPr lang="en-US"/>
+              <a:t> framework</a:t>
             </a:r>
             <a:endParaRPr lang="en-GB" dirty="0"/>
           </a:p>
@@ -4858,7 +4920,7 @@
           <a:p>
             <a:r>
               <a:rPr lang="en-US" dirty="0"/>
-              <a:t>About this week (Week 1)</a:t>
+              <a:t>About this week (Week 3)</a:t>
             </a:r>
             <a:endParaRPr lang="en-GB" dirty="0"/>
           </a:p>
@@ -4950,7 +5012,7 @@
           <a:p>
             <a:r>
               <a:rPr lang="en-US" dirty="0"/>
-              <a:t>Conclusion (W1S1)</a:t>
+              <a:t>Conclusion (Week 3)</a:t>
             </a:r>
             <a:endParaRPr lang="en-GB" dirty="0"/>
           </a:p>

</xml_diff>

<commit_message>
Preparing Week 3 slides.
</commit_message>
<xml_diff>
--- a/W3/0. All/W3.pptx
+++ b/W3/0. All/W3.pptx
@@ -5,14 +5,41 @@
     <p:sldMasterId id="2147483648" r:id="rId1"/>
   </p:sldMasterIdLst>
   <p:notesMasterIdLst>
-    <p:notesMasterId r:id="rId7"/>
+    <p:notesMasterId r:id="rId34"/>
   </p:notesMasterIdLst>
   <p:sldIdLst>
     <p:sldId id="377" r:id="rId2"/>
     <p:sldId id="257" r:id="rId3"/>
-    <p:sldId id="346" r:id="rId4"/>
-    <p:sldId id="267" r:id="rId5"/>
-    <p:sldId id="266" r:id="rId6"/>
+    <p:sldId id="378" r:id="rId4"/>
+    <p:sldId id="379" r:id="rId5"/>
+    <p:sldId id="380" r:id="rId6"/>
+    <p:sldId id="381" r:id="rId7"/>
+    <p:sldId id="382" r:id="rId8"/>
+    <p:sldId id="404" r:id="rId9"/>
+    <p:sldId id="383" r:id="rId10"/>
+    <p:sldId id="384" r:id="rId11"/>
+    <p:sldId id="385" r:id="rId12"/>
+    <p:sldId id="386" r:id="rId13"/>
+    <p:sldId id="387" r:id="rId14"/>
+    <p:sldId id="388" r:id="rId15"/>
+    <p:sldId id="389" r:id="rId16"/>
+    <p:sldId id="390" r:id="rId17"/>
+    <p:sldId id="391" r:id="rId18"/>
+    <p:sldId id="392" r:id="rId19"/>
+    <p:sldId id="393" r:id="rId20"/>
+    <p:sldId id="394" r:id="rId21"/>
+    <p:sldId id="395" r:id="rId22"/>
+    <p:sldId id="396" r:id="rId23"/>
+    <p:sldId id="397" r:id="rId24"/>
+    <p:sldId id="398" r:id="rId25"/>
+    <p:sldId id="399" r:id="rId26"/>
+    <p:sldId id="400" r:id="rId27"/>
+    <p:sldId id="401" r:id="rId28"/>
+    <p:sldId id="402" r:id="rId29"/>
+    <p:sldId id="403" r:id="rId30"/>
+    <p:sldId id="346" r:id="rId31"/>
+    <p:sldId id="267" r:id="rId32"/>
+    <p:sldId id="266" r:id="rId33"/>
   </p:sldIdLst>
   <p:sldSz cx="12192000" cy="6858000"/>
   <p:notesSz cx="6858000" cy="9144000"/>
@@ -124,6 +151,141 @@
             <p14:sldId id="257"/>
           </p14:sldIdLst>
         </p14:section>
+        <p14:section name="I.1. The PyTorch framework and its benefits" id="{3DB4E890-7E90-4FB2-B232-A4CA3E58405F}">
+          <p14:sldIdLst>
+            <p14:sldId id="378"/>
+          </p14:sldIdLst>
+        </p14:section>
+        <p14:section name="I.2. The PyTorch Tensor object" id="{1768638D-70DA-424F-8896-144E38C20B7E}">
+          <p14:sldIdLst>
+            <p14:sldId id="379"/>
+          </p14:sldIdLst>
+        </p14:section>
+        <p14:section name="I.3. Basic operations on Tensors" id="{D24780B9-223D-471E-BEA1-2E21C247BAE1}">
+          <p14:sldIdLst>
+            <p14:sldId id="380"/>
+          </p14:sldIdLst>
+        </p14:section>
+        <p14:section name="I.4. A quick note on broadcasting" id="{3C6B118A-E43B-4020-95D5-D22B27E8CE6F}">
+          <p14:sldIdLst>
+            <p14:sldId id="381"/>
+          </p14:sldIdLst>
+        </p14:section>
+        <p14:section name="I.5. Tensor locations" id="{771AE218-AC06-4FBC-B137-8E732849AA6C}">
+          <p14:sldIdLst>
+            <p14:sldId id="382"/>
+          </p14:sldIdLst>
+        </p14:section>
+        <p14:section name="I.6. A bit of practice" id="{7E6DFD35-08C1-4CD1-A069-3CEB97555F1B}">
+          <p14:sldIdLst>
+            <p14:sldId id="404"/>
+          </p14:sldIdLst>
+        </p14:section>
+        <p14:section name="II.1. Converting our model into PyTorch" id="{A7F7FB4A-93A3-4669-8DFC-6DF59244797C}">
+          <p14:sldIdLst>
+            <p14:sldId id="383"/>
+          </p14:sldIdLst>
+        </p14:section>
+        <p14:section name="II.2. Writing a forward method" id="{EE78A32E-26E9-4654-8BBF-1E279E6C714E}">
+          <p14:sldIdLst>
+            <p14:sldId id="384"/>
+          </p14:sldIdLst>
+        </p14:section>
+        <p14:section name="II.3. Implementing a loss and accuracy" id="{D114062D-C6B3-459C-BCC8-5DE3703BF52F}">
+          <p14:sldIdLst>
+            <p14:sldId id="385"/>
+          </p14:sldIdLst>
+        </p14:section>
+        <p14:section name="II.4. Computation times: GPU vs. CPU" id="{66311FC7-18C1-4097-8DBA-A5161CD65364}">
+          <p14:sldIdLst>
+            <p14:sldId id="386"/>
+          </p14:sldIdLst>
+        </p14:section>
+        <p14:section name="III.1. Autograd the beast" id="{19687F76-71BB-45E7-B8C7-38B1A65DDA6A}">
+          <p14:sldIdLst>
+            <p14:sldId id="387"/>
+          </p14:sldIdLst>
+        </p14:section>
+        <p14:section name="III.2. Implementing a simple gradient descent" id="{76A3535D-AB29-4E9E-8C0A-231B2FE96A38}">
+          <p14:sldIdLst>
+            <p14:sldId id="388"/>
+          </p14:sldIdLst>
+        </p14:section>
+        <p14:section name="III.3. Backpropagation and no_grad()" id="{CB5D7E1A-1513-4D06-AD0A-63CEC9F8E7C4}">
+          <p14:sldIdLst>
+            <p14:sldId id="389"/>
+          </p14:sldIdLst>
+        </p14:section>
+        <p14:section name="IV.1. Losses and Metrics in PyTorch" id="{E2BC7EF5-C7D5-492D-A438-4E9ED9694EF7}">
+          <p14:sldIdLst>
+            <p14:sldId id="390"/>
+          </p14:sldIdLst>
+        </p14:section>
+        <p14:section name="IV.2. Advanced Optimizers in PyTorch" id="{6BC0117F-1D0C-409A-833E-C7EE3E9502E3}">
+          <p14:sldIdLst>
+            <p14:sldId id="391"/>
+          </p14:sldIdLst>
+        </p14:section>
+        <p14:section name="IV.3. Revising our Backprop and Train" id="{8B7915C0-3DB5-44B3-8880-9D9BEF380E16}">
+          <p14:sldIdLst>
+            <p14:sldId id="392"/>
+          </p14:sldIdLst>
+        </p14:section>
+        <p14:section name="V.1. Dataloaders for mini-batches" id="{4E3A828C-E499-48C2-BA63-F36EF42F7E48}">
+          <p14:sldIdLst>
+            <p14:sldId id="393"/>
+          </p14:sldIdLst>
+        </p14:section>
+        <p14:section name="V.2. Initializers" id="{074E8EDD-F3DA-4195-AAA1-EBB4E429D0DE}">
+          <p14:sldIdLst>
+            <p14:sldId id="394"/>
+          </p14:sldIdLst>
+        </p14:section>
+        <p14:section name="V.3. Regularization" id="{FC804AC1-DACD-4AFE-AF3D-8D0DC3116991}">
+          <p14:sldIdLst>
+            <p14:sldId id="395"/>
+          </p14:sldIdLst>
+        </p14:section>
+        <p14:section name="VI.1. Loading Datasets from PyTorch" id="{029F27C1-5003-42D3-8F05-DA9DEB96D345}">
+          <p14:sldIdLst>
+            <p14:sldId id="396"/>
+          </p14:sldIdLst>
+        </p14:section>
+        <p14:section name="VI.2. Writing a custom Dataset object" id="{10E169D6-B6C7-473D-9387-FE616ABEAF92}">
+          <p14:sldIdLst>
+            <p14:sldId id="397"/>
+          </p14:sldIdLst>
+        </p14:section>
+        <p14:section name="VI.3. Writing a Custom Dataloader object" id="{A40E12A9-5236-4289-82D5-A3E0185A78F2}">
+          <p14:sldIdLst>
+            <p14:sldId id="398"/>
+          </p14:sldIdLst>
+        </p14:section>
+        <p14:section name="VII.1. Demo - A multi-classification task" id="{8C55ED7A-A682-4B9E-8418-647BCC6E8F0F}">
+          <p14:sldIdLst>
+            <p14:sldId id="399"/>
+          </p14:sldIdLst>
+        </p14:section>
+        <p14:section name="VII.2. Demo - Implementing the forward method" id="{5AC1EE76-9E14-486C-96FA-03FA5B870426}">
+          <p14:sldIdLst>
+            <p14:sldId id="400"/>
+          </p14:sldIdLst>
+        </p14:section>
+        <p14:section name="VII.3. Demo - Writing custom Layers and Blocks" id="{F7361A3F-5077-458D-B652-9816D9CE48F5}">
+          <p14:sldIdLst>
+            <p14:sldId id="401"/>
+          </p14:sldIdLst>
+        </p14:section>
+        <p14:section name="VII.4. Demo - Cross Entropy function extension" id="{D15E91CF-E527-45F6-9837-5D5BFB3B5CF7}">
+          <p14:sldIdLst>
+            <p14:sldId id="402"/>
+          </p14:sldIdLst>
+        </p14:section>
+        <p14:section name="VII.5. Demo - Training a Deep Neural Network" id="{477257E7-571E-4412-9E06-E0B848366484}">
+          <p14:sldIdLst>
+            <p14:sldId id="403"/>
+          </p14:sldIdLst>
+        </p14:section>
         <p14:section name="Conclusion" id="{09807B6E-2B76-45C8-B103-96D5021B68A6}">
           <p14:sldIdLst>
             <p14:sldId id="346"/>
@@ -148,8 +310,8 @@
 <pc:chgInfo xmlns:a="http://schemas.openxmlformats.org/drawingml/2006/main" xmlns:r="http://schemas.openxmlformats.org/officeDocument/2006/relationships" xmlns:ac="http://schemas.microsoft.com/office/drawing/2013/main/command" xmlns:pc="http://schemas.microsoft.com/office/powerpoint/2013/main/command">
   <pc:docChgLst>
     <pc:chgData name="Matthieu De Mari" userId="dfb708c9-d8dc-439f-9a3b-c772bf4a311c" providerId="ADAL" clId="{D2FDBEB2-E663-41FC-8A3C-AC79657DF6AB}"/>
-    <pc:docChg chg="modSld">
-      <pc:chgData name="Matthieu De Mari" userId="dfb708c9-d8dc-439f-9a3b-c772bf4a311c" providerId="ADAL" clId="{D2FDBEB2-E663-41FC-8A3C-AC79657DF6AB}" dt="2023-01-31T09:39:03.009" v="70" actId="20577"/>
+    <pc:docChg chg="addSld modSld addSection modSection">
+      <pc:chgData name="Matthieu De Mari" userId="dfb708c9-d8dc-439f-9a3b-c772bf4a311c" providerId="ADAL" clId="{D2FDBEB2-E663-41FC-8A3C-AC79657DF6AB}" dt="2023-02-03T03:01:42.142" v="254" actId="680"/>
       <pc:docMkLst>
         <pc:docMk/>
       </pc:docMkLst>
@@ -197,6 +359,211 @@
             <ac:spMk id="2" creationId="{080CEB46-CC16-4D19-8C2C-AEE9471D8168}"/>
           </ac:spMkLst>
         </pc:spChg>
+      </pc:sldChg>
+      <pc:sldChg chg="new">
+        <pc:chgData name="Matthieu De Mari" userId="dfb708c9-d8dc-439f-9a3b-c772bf4a311c" providerId="ADAL" clId="{D2FDBEB2-E663-41FC-8A3C-AC79657DF6AB}" dt="2023-02-03T02:51:20.670" v="73" actId="680"/>
+        <pc:sldMkLst>
+          <pc:docMk/>
+          <pc:sldMk cId="380766058" sldId="378"/>
+        </pc:sldMkLst>
+      </pc:sldChg>
+      <pc:sldChg chg="new">
+        <pc:chgData name="Matthieu De Mari" userId="dfb708c9-d8dc-439f-9a3b-c772bf4a311c" providerId="ADAL" clId="{D2FDBEB2-E663-41FC-8A3C-AC79657DF6AB}" dt="2023-02-03T02:51:38.488" v="76" actId="680"/>
+        <pc:sldMkLst>
+          <pc:docMk/>
+          <pc:sldMk cId="1970187575" sldId="379"/>
+        </pc:sldMkLst>
+      </pc:sldChg>
+      <pc:sldChg chg="new">
+        <pc:chgData name="Matthieu De Mari" userId="dfb708c9-d8dc-439f-9a3b-c772bf4a311c" providerId="ADAL" clId="{D2FDBEB2-E663-41FC-8A3C-AC79657DF6AB}" dt="2023-02-03T02:51:53.462" v="79" actId="680"/>
+        <pc:sldMkLst>
+          <pc:docMk/>
+          <pc:sldMk cId="2100436947" sldId="380"/>
+        </pc:sldMkLst>
+      </pc:sldChg>
+      <pc:sldChg chg="new">
+        <pc:chgData name="Matthieu De Mari" userId="dfb708c9-d8dc-439f-9a3b-c772bf4a311c" providerId="ADAL" clId="{D2FDBEB2-E663-41FC-8A3C-AC79657DF6AB}" dt="2023-02-03T02:52:06.950" v="82" actId="680"/>
+        <pc:sldMkLst>
+          <pc:docMk/>
+          <pc:sldMk cId="3251402422" sldId="381"/>
+        </pc:sldMkLst>
+      </pc:sldChg>
+      <pc:sldChg chg="new">
+        <pc:chgData name="Matthieu De Mari" userId="dfb708c9-d8dc-439f-9a3b-c772bf4a311c" providerId="ADAL" clId="{D2FDBEB2-E663-41FC-8A3C-AC79657DF6AB}" dt="2023-02-03T02:52:20.193" v="85" actId="680"/>
+        <pc:sldMkLst>
+          <pc:docMk/>
+          <pc:sldMk cId="1017635827" sldId="382"/>
+        </pc:sldMkLst>
+      </pc:sldChg>
+      <pc:sldChg chg="modSp new mod">
+        <pc:chgData name="Matthieu De Mari" userId="dfb708c9-d8dc-439f-9a3b-c772bf4a311c" providerId="ADAL" clId="{D2FDBEB2-E663-41FC-8A3C-AC79657DF6AB}" dt="2023-02-03T02:53:21.438" v="136" actId="20577"/>
+        <pc:sldMkLst>
+          <pc:docMk/>
+          <pc:sldMk cId="1921397945" sldId="383"/>
+        </pc:sldMkLst>
+        <pc:spChg chg="mod">
+          <ac:chgData name="Matthieu De Mari" userId="dfb708c9-d8dc-439f-9a3b-c772bf4a311c" providerId="ADAL" clId="{D2FDBEB2-E663-41FC-8A3C-AC79657DF6AB}" dt="2023-02-03T02:53:21.438" v="136" actId="20577"/>
+          <ac:spMkLst>
+            <pc:docMk/>
+            <pc:sldMk cId="1921397945" sldId="383"/>
+            <ac:spMk id="2" creationId="{FBC36228-8F7A-1389-12CE-514215337F1A}"/>
+          </ac:spMkLst>
+        </pc:spChg>
+      </pc:sldChg>
+      <pc:sldChg chg="new">
+        <pc:chgData name="Matthieu De Mari" userId="dfb708c9-d8dc-439f-9a3b-c772bf4a311c" providerId="ADAL" clId="{D2FDBEB2-E663-41FC-8A3C-AC79657DF6AB}" dt="2023-02-03T02:53:23.892" v="137" actId="680"/>
+        <pc:sldMkLst>
+          <pc:docMk/>
+          <pc:sldMk cId="1420298135" sldId="384"/>
+        </pc:sldMkLst>
+      </pc:sldChg>
+      <pc:sldChg chg="new">
+        <pc:chgData name="Matthieu De Mari" userId="dfb708c9-d8dc-439f-9a3b-c772bf4a311c" providerId="ADAL" clId="{D2FDBEB2-E663-41FC-8A3C-AC79657DF6AB}" dt="2023-02-03T02:53:52.250" v="141" actId="680"/>
+        <pc:sldMkLst>
+          <pc:docMk/>
+          <pc:sldMk cId="2560511070" sldId="385"/>
+        </pc:sldMkLst>
+      </pc:sldChg>
+      <pc:sldChg chg="new">
+        <pc:chgData name="Matthieu De Mari" userId="dfb708c9-d8dc-439f-9a3b-c772bf4a311c" providerId="ADAL" clId="{D2FDBEB2-E663-41FC-8A3C-AC79657DF6AB}" dt="2023-02-03T02:54:08.690" v="144" actId="680"/>
+        <pc:sldMkLst>
+          <pc:docMk/>
+          <pc:sldMk cId="1116470923" sldId="386"/>
+        </pc:sldMkLst>
+      </pc:sldChg>
+      <pc:sldChg chg="new">
+        <pc:chgData name="Matthieu De Mari" userId="dfb708c9-d8dc-439f-9a3b-c772bf4a311c" providerId="ADAL" clId="{D2FDBEB2-E663-41FC-8A3C-AC79657DF6AB}" dt="2023-02-03T02:54:29.781" v="146" actId="680"/>
+        <pc:sldMkLst>
+          <pc:docMk/>
+          <pc:sldMk cId="2474697269" sldId="387"/>
+        </pc:sldMkLst>
+      </pc:sldChg>
+      <pc:sldChg chg="new">
+        <pc:chgData name="Matthieu De Mari" userId="dfb708c9-d8dc-439f-9a3b-c772bf4a311c" providerId="ADAL" clId="{D2FDBEB2-E663-41FC-8A3C-AC79657DF6AB}" dt="2023-02-03T02:55:13.393" v="151" actId="680"/>
+        <pc:sldMkLst>
+          <pc:docMk/>
+          <pc:sldMk cId="4198773114" sldId="388"/>
+        </pc:sldMkLst>
+      </pc:sldChg>
+      <pc:sldChg chg="new">
+        <pc:chgData name="Matthieu De Mari" userId="dfb708c9-d8dc-439f-9a3b-c772bf4a311c" providerId="ADAL" clId="{D2FDBEB2-E663-41FC-8A3C-AC79657DF6AB}" dt="2023-02-03T02:55:46.912" v="154" actId="680"/>
+        <pc:sldMkLst>
+          <pc:docMk/>
+          <pc:sldMk cId="481628505" sldId="389"/>
+        </pc:sldMkLst>
+      </pc:sldChg>
+      <pc:sldChg chg="new">
+        <pc:chgData name="Matthieu De Mari" userId="dfb708c9-d8dc-439f-9a3b-c772bf4a311c" providerId="ADAL" clId="{D2FDBEB2-E663-41FC-8A3C-AC79657DF6AB}" dt="2023-02-03T02:56:14.767" v="157" actId="680"/>
+        <pc:sldMkLst>
+          <pc:docMk/>
+          <pc:sldMk cId="2128707751" sldId="390"/>
+        </pc:sldMkLst>
+      </pc:sldChg>
+      <pc:sldChg chg="new">
+        <pc:chgData name="Matthieu De Mari" userId="dfb708c9-d8dc-439f-9a3b-c772bf4a311c" providerId="ADAL" clId="{D2FDBEB2-E663-41FC-8A3C-AC79657DF6AB}" dt="2023-02-03T02:56:29.261" v="160" actId="680"/>
+        <pc:sldMkLst>
+          <pc:docMk/>
+          <pc:sldMk cId="1283478655" sldId="391"/>
+        </pc:sldMkLst>
+      </pc:sldChg>
+      <pc:sldChg chg="new">
+        <pc:chgData name="Matthieu De Mari" userId="dfb708c9-d8dc-439f-9a3b-c772bf4a311c" providerId="ADAL" clId="{D2FDBEB2-E663-41FC-8A3C-AC79657DF6AB}" dt="2023-02-03T02:56:49.133" v="163" actId="680"/>
+        <pc:sldMkLst>
+          <pc:docMk/>
+          <pc:sldMk cId="1341638402" sldId="392"/>
+        </pc:sldMkLst>
+      </pc:sldChg>
+      <pc:sldChg chg="new">
+        <pc:chgData name="Matthieu De Mari" userId="dfb708c9-d8dc-439f-9a3b-c772bf4a311c" providerId="ADAL" clId="{D2FDBEB2-E663-41FC-8A3C-AC79657DF6AB}" dt="2023-02-03T02:57:16.857" v="166" actId="680"/>
+        <pc:sldMkLst>
+          <pc:docMk/>
+          <pc:sldMk cId="949620911" sldId="393"/>
+        </pc:sldMkLst>
+      </pc:sldChg>
+      <pc:sldChg chg="new">
+        <pc:chgData name="Matthieu De Mari" userId="dfb708c9-d8dc-439f-9a3b-c772bf4a311c" providerId="ADAL" clId="{D2FDBEB2-E663-41FC-8A3C-AC79657DF6AB}" dt="2023-02-03T02:57:26.264" v="169" actId="680"/>
+        <pc:sldMkLst>
+          <pc:docMk/>
+          <pc:sldMk cId="164097668" sldId="394"/>
+        </pc:sldMkLst>
+      </pc:sldChg>
+      <pc:sldChg chg="new">
+        <pc:chgData name="Matthieu De Mari" userId="dfb708c9-d8dc-439f-9a3b-c772bf4a311c" providerId="ADAL" clId="{D2FDBEB2-E663-41FC-8A3C-AC79657DF6AB}" dt="2023-02-03T02:57:39.760" v="172" actId="680"/>
+        <pc:sldMkLst>
+          <pc:docMk/>
+          <pc:sldMk cId="3048177291" sldId="395"/>
+        </pc:sldMkLst>
+      </pc:sldChg>
+      <pc:sldChg chg="new">
+        <pc:chgData name="Matthieu De Mari" userId="dfb708c9-d8dc-439f-9a3b-c772bf4a311c" providerId="ADAL" clId="{D2FDBEB2-E663-41FC-8A3C-AC79657DF6AB}" dt="2023-02-03T02:58:04.050" v="175" actId="680"/>
+        <pc:sldMkLst>
+          <pc:docMk/>
+          <pc:sldMk cId="1458730680" sldId="396"/>
+        </pc:sldMkLst>
+      </pc:sldChg>
+      <pc:sldChg chg="new">
+        <pc:chgData name="Matthieu De Mari" userId="dfb708c9-d8dc-439f-9a3b-c772bf4a311c" providerId="ADAL" clId="{D2FDBEB2-E663-41FC-8A3C-AC79657DF6AB}" dt="2023-02-03T02:58:18.676" v="178" actId="680"/>
+        <pc:sldMkLst>
+          <pc:docMk/>
+          <pc:sldMk cId="1451434589" sldId="397"/>
+        </pc:sldMkLst>
+      </pc:sldChg>
+      <pc:sldChg chg="new">
+        <pc:chgData name="Matthieu De Mari" userId="dfb708c9-d8dc-439f-9a3b-c772bf4a311c" providerId="ADAL" clId="{D2FDBEB2-E663-41FC-8A3C-AC79657DF6AB}" dt="2023-02-03T02:58:36.414" v="181" actId="680"/>
+        <pc:sldMkLst>
+          <pc:docMk/>
+          <pc:sldMk cId="2867637474" sldId="398"/>
+        </pc:sldMkLst>
+      </pc:sldChg>
+      <pc:sldChg chg="modSp new mod">
+        <pc:chgData name="Matthieu De Mari" userId="dfb708c9-d8dc-439f-9a3b-c772bf4a311c" providerId="ADAL" clId="{D2FDBEB2-E663-41FC-8A3C-AC79657DF6AB}" dt="2023-02-03T02:59:22.033" v="235" actId="20577"/>
+        <pc:sldMkLst>
+          <pc:docMk/>
+          <pc:sldMk cId="122423608" sldId="399"/>
+        </pc:sldMkLst>
+        <pc:spChg chg="mod">
+          <ac:chgData name="Matthieu De Mari" userId="dfb708c9-d8dc-439f-9a3b-c772bf4a311c" providerId="ADAL" clId="{D2FDBEB2-E663-41FC-8A3C-AC79657DF6AB}" dt="2023-02-03T02:59:22.033" v="235" actId="20577"/>
+          <ac:spMkLst>
+            <pc:docMk/>
+            <pc:sldMk cId="122423608" sldId="399"/>
+            <ac:spMk id="2" creationId="{A8C99902-2A36-9C91-5F2C-9819DE23FB0C}"/>
+          </ac:spMkLst>
+        </pc:spChg>
+      </pc:sldChg>
+      <pc:sldChg chg="new">
+        <pc:chgData name="Matthieu De Mari" userId="dfb708c9-d8dc-439f-9a3b-c772bf4a311c" providerId="ADAL" clId="{D2FDBEB2-E663-41FC-8A3C-AC79657DF6AB}" dt="2023-02-03T02:59:37.988" v="238" actId="680"/>
+        <pc:sldMkLst>
+          <pc:docMk/>
+          <pc:sldMk cId="2642959288" sldId="400"/>
+        </pc:sldMkLst>
+      </pc:sldChg>
+      <pc:sldChg chg="new">
+        <pc:chgData name="Matthieu De Mari" userId="dfb708c9-d8dc-439f-9a3b-c772bf4a311c" providerId="ADAL" clId="{D2FDBEB2-E663-41FC-8A3C-AC79657DF6AB}" dt="2023-02-03T03:00:18.961" v="243" actId="680"/>
+        <pc:sldMkLst>
+          <pc:docMk/>
+          <pc:sldMk cId="4039171501" sldId="401"/>
+        </pc:sldMkLst>
+      </pc:sldChg>
+      <pc:sldChg chg="new">
+        <pc:chgData name="Matthieu De Mari" userId="dfb708c9-d8dc-439f-9a3b-c772bf4a311c" providerId="ADAL" clId="{D2FDBEB2-E663-41FC-8A3C-AC79657DF6AB}" dt="2023-02-03T03:00:44.919" v="246" actId="680"/>
+        <pc:sldMkLst>
+          <pc:docMk/>
+          <pc:sldMk cId="3163596145" sldId="402"/>
+        </pc:sldMkLst>
+      </pc:sldChg>
+      <pc:sldChg chg="new">
+        <pc:chgData name="Matthieu De Mari" userId="dfb708c9-d8dc-439f-9a3b-c772bf4a311c" providerId="ADAL" clId="{D2FDBEB2-E663-41FC-8A3C-AC79657DF6AB}" dt="2023-02-03T03:01:15.486" v="251" actId="680"/>
+        <pc:sldMkLst>
+          <pc:docMk/>
+          <pc:sldMk cId="101927766" sldId="403"/>
+        </pc:sldMkLst>
+      </pc:sldChg>
+      <pc:sldChg chg="new">
+        <pc:chgData name="Matthieu De Mari" userId="dfb708c9-d8dc-439f-9a3b-c772bf4a311c" providerId="ADAL" clId="{D2FDBEB2-E663-41FC-8A3C-AC79657DF6AB}" dt="2023-02-03T03:01:42.142" v="254" actId="680"/>
+        <pc:sldMkLst>
+          <pc:docMk/>
+          <pc:sldMk cId="3140288791" sldId="404"/>
+        </pc:sldMkLst>
       </pc:sldChg>
     </pc:docChg>
   </pc:docChgLst>
@@ -1143,7 +1510,7 @@
           <a:p>
             <a:fld id="{61478373-EB31-4867-8CF0-FA31364748A5}" type="datetimeFigureOut">
               <a:rPr lang="en-GB" smtClean="0"/>
-              <a:t>31/01/2023</a:t>
+              <a:t>03/02/2023</a:t>
             </a:fld>
             <a:endParaRPr lang="en-GB"/>
           </a:p>
@@ -1560,7 +1927,7 @@
           <a:p>
             <a:fld id="{E85DF616-B21E-4EF6-A6A5-95E2FB3EB1A1}" type="datetimeFigureOut">
               <a:rPr lang="en-GB" smtClean="0"/>
-              <a:t>31/01/2023</a:t>
+              <a:t>03/02/2023</a:t>
             </a:fld>
             <a:endParaRPr lang="en-GB"/>
           </a:p>
@@ -1760,7 +2127,7 @@
           <a:p>
             <a:fld id="{E85DF616-B21E-4EF6-A6A5-95E2FB3EB1A1}" type="datetimeFigureOut">
               <a:rPr lang="en-GB" smtClean="0"/>
-              <a:t>31/01/2023</a:t>
+              <a:t>03/02/2023</a:t>
             </a:fld>
             <a:endParaRPr lang="en-GB"/>
           </a:p>
@@ -1970,7 +2337,7 @@
           <a:p>
             <a:fld id="{E85DF616-B21E-4EF6-A6A5-95E2FB3EB1A1}" type="datetimeFigureOut">
               <a:rPr lang="en-GB" smtClean="0"/>
-              <a:t>31/01/2023</a:t>
+              <a:t>03/02/2023</a:t>
             </a:fld>
             <a:endParaRPr lang="en-GB"/>
           </a:p>
@@ -2170,7 +2537,7 @@
           <a:p>
             <a:fld id="{E85DF616-B21E-4EF6-A6A5-95E2FB3EB1A1}" type="datetimeFigureOut">
               <a:rPr lang="en-GB" smtClean="0"/>
-              <a:t>31/01/2023</a:t>
+              <a:t>03/02/2023</a:t>
             </a:fld>
             <a:endParaRPr lang="en-GB"/>
           </a:p>
@@ -2446,7 +2813,7 @@
           <a:p>
             <a:fld id="{E85DF616-B21E-4EF6-A6A5-95E2FB3EB1A1}" type="datetimeFigureOut">
               <a:rPr lang="en-GB" smtClean="0"/>
-              <a:t>31/01/2023</a:t>
+              <a:t>03/02/2023</a:t>
             </a:fld>
             <a:endParaRPr lang="en-GB"/>
           </a:p>
@@ -2714,7 +3081,7 @@
           <a:p>
             <a:fld id="{E85DF616-B21E-4EF6-A6A5-95E2FB3EB1A1}" type="datetimeFigureOut">
               <a:rPr lang="en-GB" smtClean="0"/>
-              <a:t>31/01/2023</a:t>
+              <a:t>03/02/2023</a:t>
             </a:fld>
             <a:endParaRPr lang="en-GB"/>
           </a:p>
@@ -3129,7 +3496,7 @@
           <a:p>
             <a:fld id="{E85DF616-B21E-4EF6-A6A5-95E2FB3EB1A1}" type="datetimeFigureOut">
               <a:rPr lang="en-GB" smtClean="0"/>
-              <a:t>31/01/2023</a:t>
+              <a:t>03/02/2023</a:t>
             </a:fld>
             <a:endParaRPr lang="en-GB"/>
           </a:p>
@@ -3271,7 +3638,7 @@
           <a:p>
             <a:fld id="{E85DF616-B21E-4EF6-A6A5-95E2FB3EB1A1}" type="datetimeFigureOut">
               <a:rPr lang="en-GB" smtClean="0"/>
-              <a:t>31/01/2023</a:t>
+              <a:t>03/02/2023</a:t>
             </a:fld>
             <a:endParaRPr lang="en-GB"/>
           </a:p>
@@ -3384,7 +3751,7 @@
           <a:p>
             <a:fld id="{E85DF616-B21E-4EF6-A6A5-95E2FB3EB1A1}" type="datetimeFigureOut">
               <a:rPr lang="en-GB" smtClean="0"/>
-              <a:t>31/01/2023</a:t>
+              <a:t>03/02/2023</a:t>
             </a:fld>
             <a:endParaRPr lang="en-GB"/>
           </a:p>
@@ -3697,7 +4064,7 @@
           <a:p>
             <a:fld id="{E85DF616-B21E-4EF6-A6A5-95E2FB3EB1A1}" type="datetimeFigureOut">
               <a:rPr lang="en-GB" smtClean="0"/>
-              <a:t>31/01/2023</a:t>
+              <a:t>03/02/2023</a:t>
             </a:fld>
             <a:endParaRPr lang="en-GB"/>
           </a:p>
@@ -3986,7 +4353,7 @@
           <a:p>
             <a:fld id="{E85DF616-B21E-4EF6-A6A5-95E2FB3EB1A1}" type="datetimeFigureOut">
               <a:rPr lang="en-GB" smtClean="0"/>
-              <a:t>31/01/2023</a:t>
+              <a:t>03/02/2023</a:t>
             </a:fld>
             <a:endParaRPr lang="en-GB"/>
           </a:p>
@@ -4229,7 +4596,7 @@
           <a:p>
             <a:fld id="{E85DF616-B21E-4EF6-A6A5-95E2FB3EB1A1}" type="datetimeFigureOut">
               <a:rPr lang="en-GB" smtClean="0"/>
-              <a:t>31/01/2023</a:t>
+              <a:t>03/02/2023</a:t>
             </a:fld>
             <a:endParaRPr lang="en-GB"/>
           </a:p>
@@ -4880,6 +5247,806 @@
 </p:sld>
 </file>
 
+<file path=ppt/slides/slide10.xml><?xml version="1.0" encoding="utf-8"?>
+<p:sld xmlns:a="http://schemas.openxmlformats.org/drawingml/2006/main" xmlns:r="http://schemas.openxmlformats.org/officeDocument/2006/relationships" xmlns:p="http://schemas.openxmlformats.org/presentationml/2006/main">
+  <p:cSld>
+    <p:spTree>
+      <p:nvGrpSpPr>
+        <p:cNvPr id="1" name=""/>
+        <p:cNvGrpSpPr/>
+        <p:nvPr/>
+      </p:nvGrpSpPr>
+      <p:grpSpPr>
+        <a:xfrm>
+          <a:off x="0" y="0"/>
+          <a:ext cx="0" cy="0"/>
+          <a:chOff x="0" y="0"/>
+          <a:chExt cx="0" cy="0"/>
+        </a:xfrm>
+      </p:grpSpPr>
+      <p:sp>
+        <p:nvSpPr>
+          <p:cNvPr id="2" name="Title 1">
+            <a:extLst>
+              <a:ext uri="{FF2B5EF4-FFF2-40B4-BE49-F238E27FC236}">
+                <a16:creationId xmlns:a16="http://schemas.microsoft.com/office/drawing/2014/main" id="{857AA423-E77E-C7F5-72AD-FB7701923EB9}"/>
+              </a:ext>
+            </a:extLst>
+          </p:cNvPr>
+          <p:cNvSpPr>
+            <a:spLocks noGrp="1"/>
+          </p:cNvSpPr>
+          <p:nvPr>
+            <p:ph type="title"/>
+          </p:nvPr>
+        </p:nvSpPr>
+        <p:spPr/>
+        <p:txBody>
+          <a:bodyPr/>
+          <a:lstStyle/>
+          <a:p>
+            <a:endParaRPr lang="en-SG"/>
+          </a:p>
+        </p:txBody>
+      </p:sp>
+      <p:sp>
+        <p:nvSpPr>
+          <p:cNvPr id="3" name="Content Placeholder 2">
+            <a:extLst>
+              <a:ext uri="{FF2B5EF4-FFF2-40B4-BE49-F238E27FC236}">
+                <a16:creationId xmlns:a16="http://schemas.microsoft.com/office/drawing/2014/main" id="{E9F46571-05A8-834D-E8F0-712DFB2A1C4F}"/>
+              </a:ext>
+            </a:extLst>
+          </p:cNvPr>
+          <p:cNvSpPr>
+            <a:spLocks noGrp="1"/>
+          </p:cNvSpPr>
+          <p:nvPr>
+            <p:ph idx="1"/>
+          </p:nvPr>
+        </p:nvSpPr>
+        <p:spPr/>
+        <p:txBody>
+          <a:bodyPr/>
+          <a:lstStyle/>
+          <a:p>
+            <a:endParaRPr lang="en-SG"/>
+          </a:p>
+        </p:txBody>
+      </p:sp>
+    </p:spTree>
+    <p:extLst>
+      <p:ext uri="{BB962C8B-B14F-4D97-AF65-F5344CB8AC3E}">
+        <p14:creationId xmlns:p14="http://schemas.microsoft.com/office/powerpoint/2010/main" val="1420298135"/>
+      </p:ext>
+    </p:extLst>
+  </p:cSld>
+  <p:clrMapOvr>
+    <a:masterClrMapping/>
+  </p:clrMapOvr>
+</p:sld>
+</file>
+
+<file path=ppt/slides/slide11.xml><?xml version="1.0" encoding="utf-8"?>
+<p:sld xmlns:a="http://schemas.openxmlformats.org/drawingml/2006/main" xmlns:r="http://schemas.openxmlformats.org/officeDocument/2006/relationships" xmlns:p="http://schemas.openxmlformats.org/presentationml/2006/main">
+  <p:cSld>
+    <p:spTree>
+      <p:nvGrpSpPr>
+        <p:cNvPr id="1" name=""/>
+        <p:cNvGrpSpPr/>
+        <p:nvPr/>
+      </p:nvGrpSpPr>
+      <p:grpSpPr>
+        <a:xfrm>
+          <a:off x="0" y="0"/>
+          <a:ext cx="0" cy="0"/>
+          <a:chOff x="0" y="0"/>
+          <a:chExt cx="0" cy="0"/>
+        </a:xfrm>
+      </p:grpSpPr>
+      <p:sp>
+        <p:nvSpPr>
+          <p:cNvPr id="2" name="Title 1">
+            <a:extLst>
+              <a:ext uri="{FF2B5EF4-FFF2-40B4-BE49-F238E27FC236}">
+                <a16:creationId xmlns:a16="http://schemas.microsoft.com/office/drawing/2014/main" id="{D7697535-1088-B797-5883-502EDFA1C675}"/>
+              </a:ext>
+            </a:extLst>
+          </p:cNvPr>
+          <p:cNvSpPr>
+            <a:spLocks noGrp="1"/>
+          </p:cNvSpPr>
+          <p:nvPr>
+            <p:ph type="title"/>
+          </p:nvPr>
+        </p:nvSpPr>
+        <p:spPr/>
+        <p:txBody>
+          <a:bodyPr/>
+          <a:lstStyle/>
+          <a:p>
+            <a:endParaRPr lang="en-SG"/>
+          </a:p>
+        </p:txBody>
+      </p:sp>
+      <p:sp>
+        <p:nvSpPr>
+          <p:cNvPr id="3" name="Content Placeholder 2">
+            <a:extLst>
+              <a:ext uri="{FF2B5EF4-FFF2-40B4-BE49-F238E27FC236}">
+                <a16:creationId xmlns:a16="http://schemas.microsoft.com/office/drawing/2014/main" id="{BA745D00-1AA4-E710-F652-A7E165C17CC6}"/>
+              </a:ext>
+            </a:extLst>
+          </p:cNvPr>
+          <p:cNvSpPr>
+            <a:spLocks noGrp="1"/>
+          </p:cNvSpPr>
+          <p:nvPr>
+            <p:ph idx="1"/>
+          </p:nvPr>
+        </p:nvSpPr>
+        <p:spPr/>
+        <p:txBody>
+          <a:bodyPr/>
+          <a:lstStyle/>
+          <a:p>
+            <a:endParaRPr lang="en-SG"/>
+          </a:p>
+        </p:txBody>
+      </p:sp>
+    </p:spTree>
+    <p:extLst>
+      <p:ext uri="{BB962C8B-B14F-4D97-AF65-F5344CB8AC3E}">
+        <p14:creationId xmlns:p14="http://schemas.microsoft.com/office/powerpoint/2010/main" val="2560511070"/>
+      </p:ext>
+    </p:extLst>
+  </p:cSld>
+  <p:clrMapOvr>
+    <a:masterClrMapping/>
+  </p:clrMapOvr>
+</p:sld>
+</file>
+
+<file path=ppt/slides/slide12.xml><?xml version="1.0" encoding="utf-8"?>
+<p:sld xmlns:a="http://schemas.openxmlformats.org/drawingml/2006/main" xmlns:r="http://schemas.openxmlformats.org/officeDocument/2006/relationships" xmlns:p="http://schemas.openxmlformats.org/presentationml/2006/main">
+  <p:cSld>
+    <p:spTree>
+      <p:nvGrpSpPr>
+        <p:cNvPr id="1" name=""/>
+        <p:cNvGrpSpPr/>
+        <p:nvPr/>
+      </p:nvGrpSpPr>
+      <p:grpSpPr>
+        <a:xfrm>
+          <a:off x="0" y="0"/>
+          <a:ext cx="0" cy="0"/>
+          <a:chOff x="0" y="0"/>
+          <a:chExt cx="0" cy="0"/>
+        </a:xfrm>
+      </p:grpSpPr>
+      <p:sp>
+        <p:nvSpPr>
+          <p:cNvPr id="2" name="Title 1">
+            <a:extLst>
+              <a:ext uri="{FF2B5EF4-FFF2-40B4-BE49-F238E27FC236}">
+                <a16:creationId xmlns:a16="http://schemas.microsoft.com/office/drawing/2014/main" id="{FBBD2A6B-552C-9A92-9B5D-5DB897023119}"/>
+              </a:ext>
+            </a:extLst>
+          </p:cNvPr>
+          <p:cNvSpPr>
+            <a:spLocks noGrp="1"/>
+          </p:cNvSpPr>
+          <p:nvPr>
+            <p:ph type="title"/>
+          </p:nvPr>
+        </p:nvSpPr>
+        <p:spPr/>
+        <p:txBody>
+          <a:bodyPr/>
+          <a:lstStyle/>
+          <a:p>
+            <a:endParaRPr lang="en-SG"/>
+          </a:p>
+        </p:txBody>
+      </p:sp>
+      <p:sp>
+        <p:nvSpPr>
+          <p:cNvPr id="3" name="Content Placeholder 2">
+            <a:extLst>
+              <a:ext uri="{FF2B5EF4-FFF2-40B4-BE49-F238E27FC236}">
+                <a16:creationId xmlns:a16="http://schemas.microsoft.com/office/drawing/2014/main" id="{44608F03-1D5E-5E62-5A70-1B8EB17DF397}"/>
+              </a:ext>
+            </a:extLst>
+          </p:cNvPr>
+          <p:cNvSpPr>
+            <a:spLocks noGrp="1"/>
+          </p:cNvSpPr>
+          <p:nvPr>
+            <p:ph idx="1"/>
+          </p:nvPr>
+        </p:nvSpPr>
+        <p:spPr/>
+        <p:txBody>
+          <a:bodyPr/>
+          <a:lstStyle/>
+          <a:p>
+            <a:endParaRPr lang="en-SG"/>
+          </a:p>
+        </p:txBody>
+      </p:sp>
+    </p:spTree>
+    <p:extLst>
+      <p:ext uri="{BB962C8B-B14F-4D97-AF65-F5344CB8AC3E}">
+        <p14:creationId xmlns:p14="http://schemas.microsoft.com/office/powerpoint/2010/main" val="1116470923"/>
+      </p:ext>
+    </p:extLst>
+  </p:cSld>
+  <p:clrMapOvr>
+    <a:masterClrMapping/>
+  </p:clrMapOvr>
+</p:sld>
+</file>
+
+<file path=ppt/slides/slide13.xml><?xml version="1.0" encoding="utf-8"?>
+<p:sld xmlns:a="http://schemas.openxmlformats.org/drawingml/2006/main" xmlns:r="http://schemas.openxmlformats.org/officeDocument/2006/relationships" xmlns:p="http://schemas.openxmlformats.org/presentationml/2006/main">
+  <p:cSld>
+    <p:spTree>
+      <p:nvGrpSpPr>
+        <p:cNvPr id="1" name=""/>
+        <p:cNvGrpSpPr/>
+        <p:nvPr/>
+      </p:nvGrpSpPr>
+      <p:grpSpPr>
+        <a:xfrm>
+          <a:off x="0" y="0"/>
+          <a:ext cx="0" cy="0"/>
+          <a:chOff x="0" y="0"/>
+          <a:chExt cx="0" cy="0"/>
+        </a:xfrm>
+      </p:grpSpPr>
+      <p:sp>
+        <p:nvSpPr>
+          <p:cNvPr id="2" name="Title 1">
+            <a:extLst>
+              <a:ext uri="{FF2B5EF4-FFF2-40B4-BE49-F238E27FC236}">
+                <a16:creationId xmlns:a16="http://schemas.microsoft.com/office/drawing/2014/main" id="{917AFA90-DB7E-A390-9716-D81708D85130}"/>
+              </a:ext>
+            </a:extLst>
+          </p:cNvPr>
+          <p:cNvSpPr>
+            <a:spLocks noGrp="1"/>
+          </p:cNvSpPr>
+          <p:nvPr>
+            <p:ph type="title"/>
+          </p:nvPr>
+        </p:nvSpPr>
+        <p:spPr/>
+        <p:txBody>
+          <a:bodyPr/>
+          <a:lstStyle/>
+          <a:p>
+            <a:endParaRPr lang="en-SG"/>
+          </a:p>
+        </p:txBody>
+      </p:sp>
+      <p:sp>
+        <p:nvSpPr>
+          <p:cNvPr id="3" name="Content Placeholder 2">
+            <a:extLst>
+              <a:ext uri="{FF2B5EF4-FFF2-40B4-BE49-F238E27FC236}">
+                <a16:creationId xmlns:a16="http://schemas.microsoft.com/office/drawing/2014/main" id="{C7732CA9-163D-B4B0-71B2-AEA1EC81E0E6}"/>
+              </a:ext>
+            </a:extLst>
+          </p:cNvPr>
+          <p:cNvSpPr>
+            <a:spLocks noGrp="1"/>
+          </p:cNvSpPr>
+          <p:nvPr>
+            <p:ph idx="1"/>
+          </p:nvPr>
+        </p:nvSpPr>
+        <p:spPr/>
+        <p:txBody>
+          <a:bodyPr/>
+          <a:lstStyle/>
+          <a:p>
+            <a:endParaRPr lang="en-SG"/>
+          </a:p>
+        </p:txBody>
+      </p:sp>
+    </p:spTree>
+    <p:extLst>
+      <p:ext uri="{BB962C8B-B14F-4D97-AF65-F5344CB8AC3E}">
+        <p14:creationId xmlns:p14="http://schemas.microsoft.com/office/powerpoint/2010/main" val="2474697269"/>
+      </p:ext>
+    </p:extLst>
+  </p:cSld>
+  <p:clrMapOvr>
+    <a:masterClrMapping/>
+  </p:clrMapOvr>
+</p:sld>
+</file>
+
+<file path=ppt/slides/slide14.xml><?xml version="1.0" encoding="utf-8"?>
+<p:sld xmlns:a="http://schemas.openxmlformats.org/drawingml/2006/main" xmlns:r="http://schemas.openxmlformats.org/officeDocument/2006/relationships" xmlns:p="http://schemas.openxmlformats.org/presentationml/2006/main">
+  <p:cSld>
+    <p:spTree>
+      <p:nvGrpSpPr>
+        <p:cNvPr id="1" name=""/>
+        <p:cNvGrpSpPr/>
+        <p:nvPr/>
+      </p:nvGrpSpPr>
+      <p:grpSpPr>
+        <a:xfrm>
+          <a:off x="0" y="0"/>
+          <a:ext cx="0" cy="0"/>
+          <a:chOff x="0" y="0"/>
+          <a:chExt cx="0" cy="0"/>
+        </a:xfrm>
+      </p:grpSpPr>
+      <p:sp>
+        <p:nvSpPr>
+          <p:cNvPr id="2" name="Title 1">
+            <a:extLst>
+              <a:ext uri="{FF2B5EF4-FFF2-40B4-BE49-F238E27FC236}">
+                <a16:creationId xmlns:a16="http://schemas.microsoft.com/office/drawing/2014/main" id="{408CA521-96F3-C600-A042-370E3F36CE6B}"/>
+              </a:ext>
+            </a:extLst>
+          </p:cNvPr>
+          <p:cNvSpPr>
+            <a:spLocks noGrp="1"/>
+          </p:cNvSpPr>
+          <p:nvPr>
+            <p:ph type="title"/>
+          </p:nvPr>
+        </p:nvSpPr>
+        <p:spPr/>
+        <p:txBody>
+          <a:bodyPr/>
+          <a:lstStyle/>
+          <a:p>
+            <a:endParaRPr lang="en-SG"/>
+          </a:p>
+        </p:txBody>
+      </p:sp>
+      <p:sp>
+        <p:nvSpPr>
+          <p:cNvPr id="3" name="Content Placeholder 2">
+            <a:extLst>
+              <a:ext uri="{FF2B5EF4-FFF2-40B4-BE49-F238E27FC236}">
+                <a16:creationId xmlns:a16="http://schemas.microsoft.com/office/drawing/2014/main" id="{46D88AA4-084D-50F6-7F5E-69051FD9A887}"/>
+              </a:ext>
+            </a:extLst>
+          </p:cNvPr>
+          <p:cNvSpPr>
+            <a:spLocks noGrp="1"/>
+          </p:cNvSpPr>
+          <p:nvPr>
+            <p:ph idx="1"/>
+          </p:nvPr>
+        </p:nvSpPr>
+        <p:spPr/>
+        <p:txBody>
+          <a:bodyPr/>
+          <a:lstStyle/>
+          <a:p>
+            <a:endParaRPr lang="en-SG"/>
+          </a:p>
+        </p:txBody>
+      </p:sp>
+    </p:spTree>
+    <p:extLst>
+      <p:ext uri="{BB962C8B-B14F-4D97-AF65-F5344CB8AC3E}">
+        <p14:creationId xmlns:p14="http://schemas.microsoft.com/office/powerpoint/2010/main" val="4198773114"/>
+      </p:ext>
+    </p:extLst>
+  </p:cSld>
+  <p:clrMapOvr>
+    <a:masterClrMapping/>
+  </p:clrMapOvr>
+</p:sld>
+</file>
+
+<file path=ppt/slides/slide15.xml><?xml version="1.0" encoding="utf-8"?>
+<p:sld xmlns:a="http://schemas.openxmlformats.org/drawingml/2006/main" xmlns:r="http://schemas.openxmlformats.org/officeDocument/2006/relationships" xmlns:p="http://schemas.openxmlformats.org/presentationml/2006/main">
+  <p:cSld>
+    <p:spTree>
+      <p:nvGrpSpPr>
+        <p:cNvPr id="1" name=""/>
+        <p:cNvGrpSpPr/>
+        <p:nvPr/>
+      </p:nvGrpSpPr>
+      <p:grpSpPr>
+        <a:xfrm>
+          <a:off x="0" y="0"/>
+          <a:ext cx="0" cy="0"/>
+          <a:chOff x="0" y="0"/>
+          <a:chExt cx="0" cy="0"/>
+        </a:xfrm>
+      </p:grpSpPr>
+      <p:sp>
+        <p:nvSpPr>
+          <p:cNvPr id="2" name="Title 1">
+            <a:extLst>
+              <a:ext uri="{FF2B5EF4-FFF2-40B4-BE49-F238E27FC236}">
+                <a16:creationId xmlns:a16="http://schemas.microsoft.com/office/drawing/2014/main" id="{62DF8571-F31A-11B4-26C7-2C202A57B4A3}"/>
+              </a:ext>
+            </a:extLst>
+          </p:cNvPr>
+          <p:cNvSpPr>
+            <a:spLocks noGrp="1"/>
+          </p:cNvSpPr>
+          <p:nvPr>
+            <p:ph type="title"/>
+          </p:nvPr>
+        </p:nvSpPr>
+        <p:spPr/>
+        <p:txBody>
+          <a:bodyPr/>
+          <a:lstStyle/>
+          <a:p>
+            <a:endParaRPr lang="en-SG"/>
+          </a:p>
+        </p:txBody>
+      </p:sp>
+      <p:sp>
+        <p:nvSpPr>
+          <p:cNvPr id="3" name="Content Placeholder 2">
+            <a:extLst>
+              <a:ext uri="{FF2B5EF4-FFF2-40B4-BE49-F238E27FC236}">
+                <a16:creationId xmlns:a16="http://schemas.microsoft.com/office/drawing/2014/main" id="{6C4142A3-3578-C842-742A-3495AD72B776}"/>
+              </a:ext>
+            </a:extLst>
+          </p:cNvPr>
+          <p:cNvSpPr>
+            <a:spLocks noGrp="1"/>
+          </p:cNvSpPr>
+          <p:nvPr>
+            <p:ph idx="1"/>
+          </p:nvPr>
+        </p:nvSpPr>
+        <p:spPr/>
+        <p:txBody>
+          <a:bodyPr/>
+          <a:lstStyle/>
+          <a:p>
+            <a:endParaRPr lang="en-SG"/>
+          </a:p>
+        </p:txBody>
+      </p:sp>
+    </p:spTree>
+    <p:extLst>
+      <p:ext uri="{BB962C8B-B14F-4D97-AF65-F5344CB8AC3E}">
+        <p14:creationId xmlns:p14="http://schemas.microsoft.com/office/powerpoint/2010/main" val="481628505"/>
+      </p:ext>
+    </p:extLst>
+  </p:cSld>
+  <p:clrMapOvr>
+    <a:masterClrMapping/>
+  </p:clrMapOvr>
+</p:sld>
+</file>
+
+<file path=ppt/slides/slide16.xml><?xml version="1.0" encoding="utf-8"?>
+<p:sld xmlns:a="http://schemas.openxmlformats.org/drawingml/2006/main" xmlns:r="http://schemas.openxmlformats.org/officeDocument/2006/relationships" xmlns:p="http://schemas.openxmlformats.org/presentationml/2006/main">
+  <p:cSld>
+    <p:spTree>
+      <p:nvGrpSpPr>
+        <p:cNvPr id="1" name=""/>
+        <p:cNvGrpSpPr/>
+        <p:nvPr/>
+      </p:nvGrpSpPr>
+      <p:grpSpPr>
+        <a:xfrm>
+          <a:off x="0" y="0"/>
+          <a:ext cx="0" cy="0"/>
+          <a:chOff x="0" y="0"/>
+          <a:chExt cx="0" cy="0"/>
+        </a:xfrm>
+      </p:grpSpPr>
+      <p:sp>
+        <p:nvSpPr>
+          <p:cNvPr id="2" name="Title 1">
+            <a:extLst>
+              <a:ext uri="{FF2B5EF4-FFF2-40B4-BE49-F238E27FC236}">
+                <a16:creationId xmlns:a16="http://schemas.microsoft.com/office/drawing/2014/main" id="{C902DDAE-7B18-E047-726C-A4619D106A2D}"/>
+              </a:ext>
+            </a:extLst>
+          </p:cNvPr>
+          <p:cNvSpPr>
+            <a:spLocks noGrp="1"/>
+          </p:cNvSpPr>
+          <p:nvPr>
+            <p:ph type="title"/>
+          </p:nvPr>
+        </p:nvSpPr>
+        <p:spPr/>
+        <p:txBody>
+          <a:bodyPr/>
+          <a:lstStyle/>
+          <a:p>
+            <a:endParaRPr lang="en-SG"/>
+          </a:p>
+        </p:txBody>
+      </p:sp>
+      <p:sp>
+        <p:nvSpPr>
+          <p:cNvPr id="3" name="Content Placeholder 2">
+            <a:extLst>
+              <a:ext uri="{FF2B5EF4-FFF2-40B4-BE49-F238E27FC236}">
+                <a16:creationId xmlns:a16="http://schemas.microsoft.com/office/drawing/2014/main" id="{49277AC5-542C-30AE-22EA-34F02B102AF5}"/>
+              </a:ext>
+            </a:extLst>
+          </p:cNvPr>
+          <p:cNvSpPr>
+            <a:spLocks noGrp="1"/>
+          </p:cNvSpPr>
+          <p:nvPr>
+            <p:ph idx="1"/>
+          </p:nvPr>
+        </p:nvSpPr>
+        <p:spPr/>
+        <p:txBody>
+          <a:bodyPr/>
+          <a:lstStyle/>
+          <a:p>
+            <a:endParaRPr lang="en-SG"/>
+          </a:p>
+        </p:txBody>
+      </p:sp>
+    </p:spTree>
+    <p:extLst>
+      <p:ext uri="{BB962C8B-B14F-4D97-AF65-F5344CB8AC3E}">
+        <p14:creationId xmlns:p14="http://schemas.microsoft.com/office/powerpoint/2010/main" val="2128707751"/>
+      </p:ext>
+    </p:extLst>
+  </p:cSld>
+  <p:clrMapOvr>
+    <a:masterClrMapping/>
+  </p:clrMapOvr>
+</p:sld>
+</file>
+
+<file path=ppt/slides/slide17.xml><?xml version="1.0" encoding="utf-8"?>
+<p:sld xmlns:a="http://schemas.openxmlformats.org/drawingml/2006/main" xmlns:r="http://schemas.openxmlformats.org/officeDocument/2006/relationships" xmlns:p="http://schemas.openxmlformats.org/presentationml/2006/main">
+  <p:cSld>
+    <p:spTree>
+      <p:nvGrpSpPr>
+        <p:cNvPr id="1" name=""/>
+        <p:cNvGrpSpPr/>
+        <p:nvPr/>
+      </p:nvGrpSpPr>
+      <p:grpSpPr>
+        <a:xfrm>
+          <a:off x="0" y="0"/>
+          <a:ext cx="0" cy="0"/>
+          <a:chOff x="0" y="0"/>
+          <a:chExt cx="0" cy="0"/>
+        </a:xfrm>
+      </p:grpSpPr>
+      <p:sp>
+        <p:nvSpPr>
+          <p:cNvPr id="2" name="Title 1">
+            <a:extLst>
+              <a:ext uri="{FF2B5EF4-FFF2-40B4-BE49-F238E27FC236}">
+                <a16:creationId xmlns:a16="http://schemas.microsoft.com/office/drawing/2014/main" id="{9E92E9E4-1AEF-6408-1465-D1DC917DE2AF}"/>
+              </a:ext>
+            </a:extLst>
+          </p:cNvPr>
+          <p:cNvSpPr>
+            <a:spLocks noGrp="1"/>
+          </p:cNvSpPr>
+          <p:nvPr>
+            <p:ph type="title"/>
+          </p:nvPr>
+        </p:nvSpPr>
+        <p:spPr/>
+        <p:txBody>
+          <a:bodyPr/>
+          <a:lstStyle/>
+          <a:p>
+            <a:endParaRPr lang="en-SG"/>
+          </a:p>
+        </p:txBody>
+      </p:sp>
+      <p:sp>
+        <p:nvSpPr>
+          <p:cNvPr id="3" name="Content Placeholder 2">
+            <a:extLst>
+              <a:ext uri="{FF2B5EF4-FFF2-40B4-BE49-F238E27FC236}">
+                <a16:creationId xmlns:a16="http://schemas.microsoft.com/office/drawing/2014/main" id="{EDC87932-752D-FABC-76EF-38023409D8D8}"/>
+              </a:ext>
+            </a:extLst>
+          </p:cNvPr>
+          <p:cNvSpPr>
+            <a:spLocks noGrp="1"/>
+          </p:cNvSpPr>
+          <p:nvPr>
+            <p:ph idx="1"/>
+          </p:nvPr>
+        </p:nvSpPr>
+        <p:spPr/>
+        <p:txBody>
+          <a:bodyPr/>
+          <a:lstStyle/>
+          <a:p>
+            <a:endParaRPr lang="en-SG"/>
+          </a:p>
+        </p:txBody>
+      </p:sp>
+    </p:spTree>
+    <p:extLst>
+      <p:ext uri="{BB962C8B-B14F-4D97-AF65-F5344CB8AC3E}">
+        <p14:creationId xmlns:p14="http://schemas.microsoft.com/office/powerpoint/2010/main" val="1283478655"/>
+      </p:ext>
+    </p:extLst>
+  </p:cSld>
+  <p:clrMapOvr>
+    <a:masterClrMapping/>
+  </p:clrMapOvr>
+</p:sld>
+</file>
+
+<file path=ppt/slides/slide18.xml><?xml version="1.0" encoding="utf-8"?>
+<p:sld xmlns:a="http://schemas.openxmlformats.org/drawingml/2006/main" xmlns:r="http://schemas.openxmlformats.org/officeDocument/2006/relationships" xmlns:p="http://schemas.openxmlformats.org/presentationml/2006/main">
+  <p:cSld>
+    <p:spTree>
+      <p:nvGrpSpPr>
+        <p:cNvPr id="1" name=""/>
+        <p:cNvGrpSpPr/>
+        <p:nvPr/>
+      </p:nvGrpSpPr>
+      <p:grpSpPr>
+        <a:xfrm>
+          <a:off x="0" y="0"/>
+          <a:ext cx="0" cy="0"/>
+          <a:chOff x="0" y="0"/>
+          <a:chExt cx="0" cy="0"/>
+        </a:xfrm>
+      </p:grpSpPr>
+      <p:sp>
+        <p:nvSpPr>
+          <p:cNvPr id="2" name="Title 1">
+            <a:extLst>
+              <a:ext uri="{FF2B5EF4-FFF2-40B4-BE49-F238E27FC236}">
+                <a16:creationId xmlns:a16="http://schemas.microsoft.com/office/drawing/2014/main" id="{BA1D3FB9-E5B8-3718-1677-AF583B6288EB}"/>
+              </a:ext>
+            </a:extLst>
+          </p:cNvPr>
+          <p:cNvSpPr>
+            <a:spLocks noGrp="1"/>
+          </p:cNvSpPr>
+          <p:nvPr>
+            <p:ph type="title"/>
+          </p:nvPr>
+        </p:nvSpPr>
+        <p:spPr/>
+        <p:txBody>
+          <a:bodyPr/>
+          <a:lstStyle/>
+          <a:p>
+            <a:endParaRPr lang="en-SG"/>
+          </a:p>
+        </p:txBody>
+      </p:sp>
+      <p:sp>
+        <p:nvSpPr>
+          <p:cNvPr id="3" name="Content Placeholder 2">
+            <a:extLst>
+              <a:ext uri="{FF2B5EF4-FFF2-40B4-BE49-F238E27FC236}">
+                <a16:creationId xmlns:a16="http://schemas.microsoft.com/office/drawing/2014/main" id="{FDA8FC24-2AC7-CCB3-CB3F-C8FDA0223A76}"/>
+              </a:ext>
+            </a:extLst>
+          </p:cNvPr>
+          <p:cNvSpPr>
+            <a:spLocks noGrp="1"/>
+          </p:cNvSpPr>
+          <p:nvPr>
+            <p:ph idx="1"/>
+          </p:nvPr>
+        </p:nvSpPr>
+        <p:spPr/>
+        <p:txBody>
+          <a:bodyPr/>
+          <a:lstStyle/>
+          <a:p>
+            <a:endParaRPr lang="en-SG"/>
+          </a:p>
+        </p:txBody>
+      </p:sp>
+    </p:spTree>
+    <p:extLst>
+      <p:ext uri="{BB962C8B-B14F-4D97-AF65-F5344CB8AC3E}">
+        <p14:creationId xmlns:p14="http://schemas.microsoft.com/office/powerpoint/2010/main" val="1341638402"/>
+      </p:ext>
+    </p:extLst>
+  </p:cSld>
+  <p:clrMapOvr>
+    <a:masterClrMapping/>
+  </p:clrMapOvr>
+</p:sld>
+</file>
+
+<file path=ppt/slides/slide19.xml><?xml version="1.0" encoding="utf-8"?>
+<p:sld xmlns:a="http://schemas.openxmlformats.org/drawingml/2006/main" xmlns:r="http://schemas.openxmlformats.org/officeDocument/2006/relationships" xmlns:p="http://schemas.openxmlformats.org/presentationml/2006/main">
+  <p:cSld>
+    <p:spTree>
+      <p:nvGrpSpPr>
+        <p:cNvPr id="1" name=""/>
+        <p:cNvGrpSpPr/>
+        <p:nvPr/>
+      </p:nvGrpSpPr>
+      <p:grpSpPr>
+        <a:xfrm>
+          <a:off x="0" y="0"/>
+          <a:ext cx="0" cy="0"/>
+          <a:chOff x="0" y="0"/>
+          <a:chExt cx="0" cy="0"/>
+        </a:xfrm>
+      </p:grpSpPr>
+      <p:sp>
+        <p:nvSpPr>
+          <p:cNvPr id="2" name="Title 1">
+            <a:extLst>
+              <a:ext uri="{FF2B5EF4-FFF2-40B4-BE49-F238E27FC236}">
+                <a16:creationId xmlns:a16="http://schemas.microsoft.com/office/drawing/2014/main" id="{6A4CAAF3-190A-9E92-5AC6-9C5B1FE21410}"/>
+              </a:ext>
+            </a:extLst>
+          </p:cNvPr>
+          <p:cNvSpPr>
+            <a:spLocks noGrp="1"/>
+          </p:cNvSpPr>
+          <p:nvPr>
+            <p:ph type="title"/>
+          </p:nvPr>
+        </p:nvSpPr>
+        <p:spPr/>
+        <p:txBody>
+          <a:bodyPr/>
+          <a:lstStyle/>
+          <a:p>
+            <a:endParaRPr lang="en-SG"/>
+          </a:p>
+        </p:txBody>
+      </p:sp>
+      <p:sp>
+        <p:nvSpPr>
+          <p:cNvPr id="3" name="Content Placeholder 2">
+            <a:extLst>
+              <a:ext uri="{FF2B5EF4-FFF2-40B4-BE49-F238E27FC236}">
+                <a16:creationId xmlns:a16="http://schemas.microsoft.com/office/drawing/2014/main" id="{D1312B6F-30FC-B3C8-3D09-B7E43EC215D5}"/>
+              </a:ext>
+            </a:extLst>
+          </p:cNvPr>
+          <p:cNvSpPr>
+            <a:spLocks noGrp="1"/>
+          </p:cNvSpPr>
+          <p:nvPr>
+            <p:ph idx="1"/>
+          </p:nvPr>
+        </p:nvSpPr>
+        <p:spPr/>
+        <p:txBody>
+          <a:bodyPr/>
+          <a:lstStyle/>
+          <a:p>
+            <a:endParaRPr lang="en-SG"/>
+          </a:p>
+        </p:txBody>
+      </p:sp>
+    </p:spTree>
+    <p:extLst>
+      <p:ext uri="{BB962C8B-B14F-4D97-AF65-F5344CB8AC3E}">
+        <p14:creationId xmlns:p14="http://schemas.microsoft.com/office/powerpoint/2010/main" val="949620911"/>
+      </p:ext>
+    </p:extLst>
+  </p:cSld>
+  <p:clrMapOvr>
+    <a:masterClrMapping/>
+  </p:clrMapOvr>
+</p:sld>
+</file>
+
 <file path=ppt/slides/slide2.xml><?xml version="1.0" encoding="utf-8"?>
 <p:sld xmlns:a="http://schemas.openxmlformats.org/drawingml/2006/main" xmlns:r="http://schemas.openxmlformats.org/officeDocument/2006/relationships" xmlns:p="http://schemas.openxmlformats.org/presentationml/2006/main">
   <p:cSld>
@@ -4963,6 +6130,818 @@
     <p:extLst>
       <p:ext uri="{BB962C8B-B14F-4D97-AF65-F5344CB8AC3E}">
         <p14:creationId xmlns:p14="http://schemas.microsoft.com/office/powerpoint/2010/main" val="3442501962"/>
+      </p:ext>
+    </p:extLst>
+  </p:cSld>
+  <p:clrMapOvr>
+    <a:masterClrMapping/>
+  </p:clrMapOvr>
+</p:sld>
+</file>
+
+<file path=ppt/slides/slide20.xml><?xml version="1.0" encoding="utf-8"?>
+<p:sld xmlns:a="http://schemas.openxmlformats.org/drawingml/2006/main" xmlns:r="http://schemas.openxmlformats.org/officeDocument/2006/relationships" xmlns:p="http://schemas.openxmlformats.org/presentationml/2006/main">
+  <p:cSld>
+    <p:spTree>
+      <p:nvGrpSpPr>
+        <p:cNvPr id="1" name=""/>
+        <p:cNvGrpSpPr/>
+        <p:nvPr/>
+      </p:nvGrpSpPr>
+      <p:grpSpPr>
+        <a:xfrm>
+          <a:off x="0" y="0"/>
+          <a:ext cx="0" cy="0"/>
+          <a:chOff x="0" y="0"/>
+          <a:chExt cx="0" cy="0"/>
+        </a:xfrm>
+      </p:grpSpPr>
+      <p:sp>
+        <p:nvSpPr>
+          <p:cNvPr id="2" name="Title 1">
+            <a:extLst>
+              <a:ext uri="{FF2B5EF4-FFF2-40B4-BE49-F238E27FC236}">
+                <a16:creationId xmlns:a16="http://schemas.microsoft.com/office/drawing/2014/main" id="{5EE3B6C1-D583-A692-9831-4EBA5FFC0843}"/>
+              </a:ext>
+            </a:extLst>
+          </p:cNvPr>
+          <p:cNvSpPr>
+            <a:spLocks noGrp="1"/>
+          </p:cNvSpPr>
+          <p:nvPr>
+            <p:ph type="title"/>
+          </p:nvPr>
+        </p:nvSpPr>
+        <p:spPr/>
+        <p:txBody>
+          <a:bodyPr/>
+          <a:lstStyle/>
+          <a:p>
+            <a:endParaRPr lang="en-SG"/>
+          </a:p>
+        </p:txBody>
+      </p:sp>
+      <p:sp>
+        <p:nvSpPr>
+          <p:cNvPr id="3" name="Content Placeholder 2">
+            <a:extLst>
+              <a:ext uri="{FF2B5EF4-FFF2-40B4-BE49-F238E27FC236}">
+                <a16:creationId xmlns:a16="http://schemas.microsoft.com/office/drawing/2014/main" id="{92E9050B-66A5-FB92-C341-496FFC678FA2}"/>
+              </a:ext>
+            </a:extLst>
+          </p:cNvPr>
+          <p:cNvSpPr>
+            <a:spLocks noGrp="1"/>
+          </p:cNvSpPr>
+          <p:nvPr>
+            <p:ph idx="1"/>
+          </p:nvPr>
+        </p:nvSpPr>
+        <p:spPr/>
+        <p:txBody>
+          <a:bodyPr/>
+          <a:lstStyle/>
+          <a:p>
+            <a:endParaRPr lang="en-SG"/>
+          </a:p>
+        </p:txBody>
+      </p:sp>
+    </p:spTree>
+    <p:extLst>
+      <p:ext uri="{BB962C8B-B14F-4D97-AF65-F5344CB8AC3E}">
+        <p14:creationId xmlns:p14="http://schemas.microsoft.com/office/powerpoint/2010/main" val="164097668"/>
+      </p:ext>
+    </p:extLst>
+  </p:cSld>
+  <p:clrMapOvr>
+    <a:masterClrMapping/>
+  </p:clrMapOvr>
+</p:sld>
+</file>
+
+<file path=ppt/slides/slide21.xml><?xml version="1.0" encoding="utf-8"?>
+<p:sld xmlns:a="http://schemas.openxmlformats.org/drawingml/2006/main" xmlns:r="http://schemas.openxmlformats.org/officeDocument/2006/relationships" xmlns:p="http://schemas.openxmlformats.org/presentationml/2006/main">
+  <p:cSld>
+    <p:spTree>
+      <p:nvGrpSpPr>
+        <p:cNvPr id="1" name=""/>
+        <p:cNvGrpSpPr/>
+        <p:nvPr/>
+      </p:nvGrpSpPr>
+      <p:grpSpPr>
+        <a:xfrm>
+          <a:off x="0" y="0"/>
+          <a:ext cx="0" cy="0"/>
+          <a:chOff x="0" y="0"/>
+          <a:chExt cx="0" cy="0"/>
+        </a:xfrm>
+      </p:grpSpPr>
+      <p:sp>
+        <p:nvSpPr>
+          <p:cNvPr id="2" name="Title 1">
+            <a:extLst>
+              <a:ext uri="{FF2B5EF4-FFF2-40B4-BE49-F238E27FC236}">
+                <a16:creationId xmlns:a16="http://schemas.microsoft.com/office/drawing/2014/main" id="{C0AEB798-137F-1C5F-D3F8-E30049627063}"/>
+              </a:ext>
+            </a:extLst>
+          </p:cNvPr>
+          <p:cNvSpPr>
+            <a:spLocks noGrp="1"/>
+          </p:cNvSpPr>
+          <p:nvPr>
+            <p:ph type="title"/>
+          </p:nvPr>
+        </p:nvSpPr>
+        <p:spPr/>
+        <p:txBody>
+          <a:bodyPr/>
+          <a:lstStyle/>
+          <a:p>
+            <a:endParaRPr lang="en-SG"/>
+          </a:p>
+        </p:txBody>
+      </p:sp>
+      <p:sp>
+        <p:nvSpPr>
+          <p:cNvPr id="3" name="Content Placeholder 2">
+            <a:extLst>
+              <a:ext uri="{FF2B5EF4-FFF2-40B4-BE49-F238E27FC236}">
+                <a16:creationId xmlns:a16="http://schemas.microsoft.com/office/drawing/2014/main" id="{6A509501-56C2-23F3-214C-C91AB5067894}"/>
+              </a:ext>
+            </a:extLst>
+          </p:cNvPr>
+          <p:cNvSpPr>
+            <a:spLocks noGrp="1"/>
+          </p:cNvSpPr>
+          <p:nvPr>
+            <p:ph idx="1"/>
+          </p:nvPr>
+        </p:nvSpPr>
+        <p:spPr/>
+        <p:txBody>
+          <a:bodyPr/>
+          <a:lstStyle/>
+          <a:p>
+            <a:endParaRPr lang="en-SG"/>
+          </a:p>
+        </p:txBody>
+      </p:sp>
+    </p:spTree>
+    <p:extLst>
+      <p:ext uri="{BB962C8B-B14F-4D97-AF65-F5344CB8AC3E}">
+        <p14:creationId xmlns:p14="http://schemas.microsoft.com/office/powerpoint/2010/main" val="3048177291"/>
+      </p:ext>
+    </p:extLst>
+  </p:cSld>
+  <p:clrMapOvr>
+    <a:masterClrMapping/>
+  </p:clrMapOvr>
+</p:sld>
+</file>
+
+<file path=ppt/slides/slide22.xml><?xml version="1.0" encoding="utf-8"?>
+<p:sld xmlns:a="http://schemas.openxmlformats.org/drawingml/2006/main" xmlns:r="http://schemas.openxmlformats.org/officeDocument/2006/relationships" xmlns:p="http://schemas.openxmlformats.org/presentationml/2006/main">
+  <p:cSld>
+    <p:spTree>
+      <p:nvGrpSpPr>
+        <p:cNvPr id="1" name=""/>
+        <p:cNvGrpSpPr/>
+        <p:nvPr/>
+      </p:nvGrpSpPr>
+      <p:grpSpPr>
+        <a:xfrm>
+          <a:off x="0" y="0"/>
+          <a:ext cx="0" cy="0"/>
+          <a:chOff x="0" y="0"/>
+          <a:chExt cx="0" cy="0"/>
+        </a:xfrm>
+      </p:grpSpPr>
+      <p:sp>
+        <p:nvSpPr>
+          <p:cNvPr id="2" name="Title 1">
+            <a:extLst>
+              <a:ext uri="{FF2B5EF4-FFF2-40B4-BE49-F238E27FC236}">
+                <a16:creationId xmlns:a16="http://schemas.microsoft.com/office/drawing/2014/main" id="{AB0F840A-9158-1C9B-1451-026D2AA9FE34}"/>
+              </a:ext>
+            </a:extLst>
+          </p:cNvPr>
+          <p:cNvSpPr>
+            <a:spLocks noGrp="1"/>
+          </p:cNvSpPr>
+          <p:nvPr>
+            <p:ph type="title"/>
+          </p:nvPr>
+        </p:nvSpPr>
+        <p:spPr/>
+        <p:txBody>
+          <a:bodyPr/>
+          <a:lstStyle/>
+          <a:p>
+            <a:endParaRPr lang="en-SG"/>
+          </a:p>
+        </p:txBody>
+      </p:sp>
+      <p:sp>
+        <p:nvSpPr>
+          <p:cNvPr id="3" name="Content Placeholder 2">
+            <a:extLst>
+              <a:ext uri="{FF2B5EF4-FFF2-40B4-BE49-F238E27FC236}">
+                <a16:creationId xmlns:a16="http://schemas.microsoft.com/office/drawing/2014/main" id="{54C2D511-85EE-1F9B-89D9-7815B51B2B8B}"/>
+              </a:ext>
+            </a:extLst>
+          </p:cNvPr>
+          <p:cNvSpPr>
+            <a:spLocks noGrp="1"/>
+          </p:cNvSpPr>
+          <p:nvPr>
+            <p:ph idx="1"/>
+          </p:nvPr>
+        </p:nvSpPr>
+        <p:spPr/>
+        <p:txBody>
+          <a:bodyPr/>
+          <a:lstStyle/>
+          <a:p>
+            <a:endParaRPr lang="en-SG"/>
+          </a:p>
+        </p:txBody>
+      </p:sp>
+    </p:spTree>
+    <p:extLst>
+      <p:ext uri="{BB962C8B-B14F-4D97-AF65-F5344CB8AC3E}">
+        <p14:creationId xmlns:p14="http://schemas.microsoft.com/office/powerpoint/2010/main" val="1458730680"/>
+      </p:ext>
+    </p:extLst>
+  </p:cSld>
+  <p:clrMapOvr>
+    <a:masterClrMapping/>
+  </p:clrMapOvr>
+</p:sld>
+</file>
+
+<file path=ppt/slides/slide23.xml><?xml version="1.0" encoding="utf-8"?>
+<p:sld xmlns:a="http://schemas.openxmlformats.org/drawingml/2006/main" xmlns:r="http://schemas.openxmlformats.org/officeDocument/2006/relationships" xmlns:p="http://schemas.openxmlformats.org/presentationml/2006/main">
+  <p:cSld>
+    <p:spTree>
+      <p:nvGrpSpPr>
+        <p:cNvPr id="1" name=""/>
+        <p:cNvGrpSpPr/>
+        <p:nvPr/>
+      </p:nvGrpSpPr>
+      <p:grpSpPr>
+        <a:xfrm>
+          <a:off x="0" y="0"/>
+          <a:ext cx="0" cy="0"/>
+          <a:chOff x="0" y="0"/>
+          <a:chExt cx="0" cy="0"/>
+        </a:xfrm>
+      </p:grpSpPr>
+      <p:sp>
+        <p:nvSpPr>
+          <p:cNvPr id="2" name="Title 1">
+            <a:extLst>
+              <a:ext uri="{FF2B5EF4-FFF2-40B4-BE49-F238E27FC236}">
+                <a16:creationId xmlns:a16="http://schemas.microsoft.com/office/drawing/2014/main" id="{E28D0FA9-852F-88EB-13B7-0F25F1E909EF}"/>
+              </a:ext>
+            </a:extLst>
+          </p:cNvPr>
+          <p:cNvSpPr>
+            <a:spLocks noGrp="1"/>
+          </p:cNvSpPr>
+          <p:nvPr>
+            <p:ph type="title"/>
+          </p:nvPr>
+        </p:nvSpPr>
+        <p:spPr/>
+        <p:txBody>
+          <a:bodyPr/>
+          <a:lstStyle/>
+          <a:p>
+            <a:endParaRPr lang="en-SG"/>
+          </a:p>
+        </p:txBody>
+      </p:sp>
+      <p:sp>
+        <p:nvSpPr>
+          <p:cNvPr id="3" name="Content Placeholder 2">
+            <a:extLst>
+              <a:ext uri="{FF2B5EF4-FFF2-40B4-BE49-F238E27FC236}">
+                <a16:creationId xmlns:a16="http://schemas.microsoft.com/office/drawing/2014/main" id="{BA2A0416-0B18-CDD3-9A37-B441AE8FAEC0}"/>
+              </a:ext>
+            </a:extLst>
+          </p:cNvPr>
+          <p:cNvSpPr>
+            <a:spLocks noGrp="1"/>
+          </p:cNvSpPr>
+          <p:nvPr>
+            <p:ph idx="1"/>
+          </p:nvPr>
+        </p:nvSpPr>
+        <p:spPr/>
+        <p:txBody>
+          <a:bodyPr/>
+          <a:lstStyle/>
+          <a:p>
+            <a:endParaRPr lang="en-SG"/>
+          </a:p>
+        </p:txBody>
+      </p:sp>
+    </p:spTree>
+    <p:extLst>
+      <p:ext uri="{BB962C8B-B14F-4D97-AF65-F5344CB8AC3E}">
+        <p14:creationId xmlns:p14="http://schemas.microsoft.com/office/powerpoint/2010/main" val="1451434589"/>
+      </p:ext>
+    </p:extLst>
+  </p:cSld>
+  <p:clrMapOvr>
+    <a:masterClrMapping/>
+  </p:clrMapOvr>
+</p:sld>
+</file>
+
+<file path=ppt/slides/slide24.xml><?xml version="1.0" encoding="utf-8"?>
+<p:sld xmlns:a="http://schemas.openxmlformats.org/drawingml/2006/main" xmlns:r="http://schemas.openxmlformats.org/officeDocument/2006/relationships" xmlns:p="http://schemas.openxmlformats.org/presentationml/2006/main">
+  <p:cSld>
+    <p:spTree>
+      <p:nvGrpSpPr>
+        <p:cNvPr id="1" name=""/>
+        <p:cNvGrpSpPr/>
+        <p:nvPr/>
+      </p:nvGrpSpPr>
+      <p:grpSpPr>
+        <a:xfrm>
+          <a:off x="0" y="0"/>
+          <a:ext cx="0" cy="0"/>
+          <a:chOff x="0" y="0"/>
+          <a:chExt cx="0" cy="0"/>
+        </a:xfrm>
+      </p:grpSpPr>
+      <p:sp>
+        <p:nvSpPr>
+          <p:cNvPr id="2" name="Title 1">
+            <a:extLst>
+              <a:ext uri="{FF2B5EF4-FFF2-40B4-BE49-F238E27FC236}">
+                <a16:creationId xmlns:a16="http://schemas.microsoft.com/office/drawing/2014/main" id="{35BA2A57-EC1A-2D3E-0000-4B064C5BA278}"/>
+              </a:ext>
+            </a:extLst>
+          </p:cNvPr>
+          <p:cNvSpPr>
+            <a:spLocks noGrp="1"/>
+          </p:cNvSpPr>
+          <p:nvPr>
+            <p:ph type="title"/>
+          </p:nvPr>
+        </p:nvSpPr>
+        <p:spPr/>
+        <p:txBody>
+          <a:bodyPr/>
+          <a:lstStyle/>
+          <a:p>
+            <a:endParaRPr lang="en-SG"/>
+          </a:p>
+        </p:txBody>
+      </p:sp>
+      <p:sp>
+        <p:nvSpPr>
+          <p:cNvPr id="3" name="Content Placeholder 2">
+            <a:extLst>
+              <a:ext uri="{FF2B5EF4-FFF2-40B4-BE49-F238E27FC236}">
+                <a16:creationId xmlns:a16="http://schemas.microsoft.com/office/drawing/2014/main" id="{77496A95-7961-91A1-EB76-E57510055A38}"/>
+              </a:ext>
+            </a:extLst>
+          </p:cNvPr>
+          <p:cNvSpPr>
+            <a:spLocks noGrp="1"/>
+          </p:cNvSpPr>
+          <p:nvPr>
+            <p:ph idx="1"/>
+          </p:nvPr>
+        </p:nvSpPr>
+        <p:spPr/>
+        <p:txBody>
+          <a:bodyPr/>
+          <a:lstStyle/>
+          <a:p>
+            <a:endParaRPr lang="en-SG"/>
+          </a:p>
+        </p:txBody>
+      </p:sp>
+    </p:spTree>
+    <p:extLst>
+      <p:ext uri="{BB962C8B-B14F-4D97-AF65-F5344CB8AC3E}">
+        <p14:creationId xmlns:p14="http://schemas.microsoft.com/office/powerpoint/2010/main" val="2867637474"/>
+      </p:ext>
+    </p:extLst>
+  </p:cSld>
+  <p:clrMapOvr>
+    <a:masterClrMapping/>
+  </p:clrMapOvr>
+</p:sld>
+</file>
+
+<file path=ppt/slides/slide25.xml><?xml version="1.0" encoding="utf-8"?>
+<p:sld xmlns:a="http://schemas.openxmlformats.org/drawingml/2006/main" xmlns:r="http://schemas.openxmlformats.org/officeDocument/2006/relationships" xmlns:p="http://schemas.openxmlformats.org/presentationml/2006/main">
+  <p:cSld>
+    <p:spTree>
+      <p:nvGrpSpPr>
+        <p:cNvPr id="1" name=""/>
+        <p:cNvGrpSpPr/>
+        <p:nvPr/>
+      </p:nvGrpSpPr>
+      <p:grpSpPr>
+        <a:xfrm>
+          <a:off x="0" y="0"/>
+          <a:ext cx="0" cy="0"/>
+          <a:chOff x="0" y="0"/>
+          <a:chExt cx="0" cy="0"/>
+        </a:xfrm>
+      </p:grpSpPr>
+      <p:sp>
+        <p:nvSpPr>
+          <p:cNvPr id="2" name="Title 1">
+            <a:extLst>
+              <a:ext uri="{FF2B5EF4-FFF2-40B4-BE49-F238E27FC236}">
+                <a16:creationId xmlns:a16="http://schemas.microsoft.com/office/drawing/2014/main" id="{A8C99902-2A36-9C91-5F2C-9819DE23FB0C}"/>
+              </a:ext>
+            </a:extLst>
+          </p:cNvPr>
+          <p:cNvSpPr>
+            <a:spLocks noGrp="1"/>
+          </p:cNvSpPr>
+          <p:nvPr>
+            <p:ph type="title"/>
+          </p:nvPr>
+        </p:nvSpPr>
+        <p:spPr/>
+        <p:txBody>
+          <a:bodyPr/>
+          <a:lstStyle/>
+          <a:p>
+            <a:r>
+              <a:rPr lang="en-GB" dirty="0"/>
+              <a:t>Dataset, </a:t>
+            </a:r>
+            <a:r>
+              <a:rPr lang="en-GB" dirty="0" err="1"/>
+              <a:t>softmax</a:t>
+            </a:r>
+            <a:r>
+              <a:rPr lang="en-GB" dirty="0"/>
+              <a:t> on predictions</a:t>
+            </a:r>
+            <a:endParaRPr lang="en-SG" dirty="0"/>
+          </a:p>
+        </p:txBody>
+      </p:sp>
+      <p:sp>
+        <p:nvSpPr>
+          <p:cNvPr id="3" name="Content Placeholder 2">
+            <a:extLst>
+              <a:ext uri="{FF2B5EF4-FFF2-40B4-BE49-F238E27FC236}">
+                <a16:creationId xmlns:a16="http://schemas.microsoft.com/office/drawing/2014/main" id="{F0814AA9-339A-72D8-E8A9-C066A3ED5800}"/>
+              </a:ext>
+            </a:extLst>
+          </p:cNvPr>
+          <p:cNvSpPr>
+            <a:spLocks noGrp="1"/>
+          </p:cNvSpPr>
+          <p:nvPr>
+            <p:ph idx="1"/>
+          </p:nvPr>
+        </p:nvSpPr>
+        <p:spPr/>
+        <p:txBody>
+          <a:bodyPr/>
+          <a:lstStyle/>
+          <a:p>
+            <a:endParaRPr lang="en-SG"/>
+          </a:p>
+        </p:txBody>
+      </p:sp>
+    </p:spTree>
+    <p:extLst>
+      <p:ext uri="{BB962C8B-B14F-4D97-AF65-F5344CB8AC3E}">
+        <p14:creationId xmlns:p14="http://schemas.microsoft.com/office/powerpoint/2010/main" val="122423608"/>
+      </p:ext>
+    </p:extLst>
+  </p:cSld>
+  <p:clrMapOvr>
+    <a:masterClrMapping/>
+  </p:clrMapOvr>
+</p:sld>
+</file>
+
+<file path=ppt/slides/slide26.xml><?xml version="1.0" encoding="utf-8"?>
+<p:sld xmlns:a="http://schemas.openxmlformats.org/drawingml/2006/main" xmlns:r="http://schemas.openxmlformats.org/officeDocument/2006/relationships" xmlns:p="http://schemas.openxmlformats.org/presentationml/2006/main">
+  <p:cSld>
+    <p:spTree>
+      <p:nvGrpSpPr>
+        <p:cNvPr id="1" name=""/>
+        <p:cNvGrpSpPr/>
+        <p:nvPr/>
+      </p:nvGrpSpPr>
+      <p:grpSpPr>
+        <a:xfrm>
+          <a:off x="0" y="0"/>
+          <a:ext cx="0" cy="0"/>
+          <a:chOff x="0" y="0"/>
+          <a:chExt cx="0" cy="0"/>
+        </a:xfrm>
+      </p:grpSpPr>
+      <p:sp>
+        <p:nvSpPr>
+          <p:cNvPr id="2" name="Title 1">
+            <a:extLst>
+              <a:ext uri="{FF2B5EF4-FFF2-40B4-BE49-F238E27FC236}">
+                <a16:creationId xmlns:a16="http://schemas.microsoft.com/office/drawing/2014/main" id="{F8582658-0B0F-0C48-8E3F-952658D25AF8}"/>
+              </a:ext>
+            </a:extLst>
+          </p:cNvPr>
+          <p:cNvSpPr>
+            <a:spLocks noGrp="1"/>
+          </p:cNvSpPr>
+          <p:nvPr>
+            <p:ph type="title"/>
+          </p:nvPr>
+        </p:nvSpPr>
+        <p:spPr/>
+        <p:txBody>
+          <a:bodyPr/>
+          <a:lstStyle/>
+          <a:p>
+            <a:endParaRPr lang="en-SG"/>
+          </a:p>
+        </p:txBody>
+      </p:sp>
+      <p:sp>
+        <p:nvSpPr>
+          <p:cNvPr id="3" name="Content Placeholder 2">
+            <a:extLst>
+              <a:ext uri="{FF2B5EF4-FFF2-40B4-BE49-F238E27FC236}">
+                <a16:creationId xmlns:a16="http://schemas.microsoft.com/office/drawing/2014/main" id="{3E248F5A-731F-19B8-49B8-314E96AF5628}"/>
+              </a:ext>
+            </a:extLst>
+          </p:cNvPr>
+          <p:cNvSpPr>
+            <a:spLocks noGrp="1"/>
+          </p:cNvSpPr>
+          <p:nvPr>
+            <p:ph idx="1"/>
+          </p:nvPr>
+        </p:nvSpPr>
+        <p:spPr/>
+        <p:txBody>
+          <a:bodyPr/>
+          <a:lstStyle/>
+          <a:p>
+            <a:endParaRPr lang="en-SG"/>
+          </a:p>
+        </p:txBody>
+      </p:sp>
+    </p:spTree>
+    <p:extLst>
+      <p:ext uri="{BB962C8B-B14F-4D97-AF65-F5344CB8AC3E}">
+        <p14:creationId xmlns:p14="http://schemas.microsoft.com/office/powerpoint/2010/main" val="2642959288"/>
+      </p:ext>
+    </p:extLst>
+  </p:cSld>
+  <p:clrMapOvr>
+    <a:masterClrMapping/>
+  </p:clrMapOvr>
+</p:sld>
+</file>
+
+<file path=ppt/slides/slide27.xml><?xml version="1.0" encoding="utf-8"?>
+<p:sld xmlns:a="http://schemas.openxmlformats.org/drawingml/2006/main" xmlns:r="http://schemas.openxmlformats.org/officeDocument/2006/relationships" xmlns:p="http://schemas.openxmlformats.org/presentationml/2006/main">
+  <p:cSld>
+    <p:spTree>
+      <p:nvGrpSpPr>
+        <p:cNvPr id="1" name=""/>
+        <p:cNvGrpSpPr/>
+        <p:nvPr/>
+      </p:nvGrpSpPr>
+      <p:grpSpPr>
+        <a:xfrm>
+          <a:off x="0" y="0"/>
+          <a:ext cx="0" cy="0"/>
+          <a:chOff x="0" y="0"/>
+          <a:chExt cx="0" cy="0"/>
+        </a:xfrm>
+      </p:grpSpPr>
+      <p:sp>
+        <p:nvSpPr>
+          <p:cNvPr id="2" name="Title 1">
+            <a:extLst>
+              <a:ext uri="{FF2B5EF4-FFF2-40B4-BE49-F238E27FC236}">
+                <a16:creationId xmlns:a16="http://schemas.microsoft.com/office/drawing/2014/main" id="{AC1D82E3-0CF1-4CB6-B079-94D3470FB21B}"/>
+              </a:ext>
+            </a:extLst>
+          </p:cNvPr>
+          <p:cNvSpPr>
+            <a:spLocks noGrp="1"/>
+          </p:cNvSpPr>
+          <p:nvPr>
+            <p:ph type="title"/>
+          </p:nvPr>
+        </p:nvSpPr>
+        <p:spPr/>
+        <p:txBody>
+          <a:bodyPr/>
+          <a:lstStyle/>
+          <a:p>
+            <a:endParaRPr lang="en-SG"/>
+          </a:p>
+        </p:txBody>
+      </p:sp>
+      <p:sp>
+        <p:nvSpPr>
+          <p:cNvPr id="3" name="Content Placeholder 2">
+            <a:extLst>
+              <a:ext uri="{FF2B5EF4-FFF2-40B4-BE49-F238E27FC236}">
+                <a16:creationId xmlns:a16="http://schemas.microsoft.com/office/drawing/2014/main" id="{63E638E1-0E19-7F02-7FE0-49EBCE47EBFA}"/>
+              </a:ext>
+            </a:extLst>
+          </p:cNvPr>
+          <p:cNvSpPr>
+            <a:spLocks noGrp="1"/>
+          </p:cNvSpPr>
+          <p:nvPr>
+            <p:ph idx="1"/>
+          </p:nvPr>
+        </p:nvSpPr>
+        <p:spPr/>
+        <p:txBody>
+          <a:bodyPr/>
+          <a:lstStyle/>
+          <a:p>
+            <a:endParaRPr lang="en-SG"/>
+          </a:p>
+        </p:txBody>
+      </p:sp>
+    </p:spTree>
+    <p:extLst>
+      <p:ext uri="{BB962C8B-B14F-4D97-AF65-F5344CB8AC3E}">
+        <p14:creationId xmlns:p14="http://schemas.microsoft.com/office/powerpoint/2010/main" val="4039171501"/>
+      </p:ext>
+    </p:extLst>
+  </p:cSld>
+  <p:clrMapOvr>
+    <a:masterClrMapping/>
+  </p:clrMapOvr>
+</p:sld>
+</file>
+
+<file path=ppt/slides/slide28.xml><?xml version="1.0" encoding="utf-8"?>
+<p:sld xmlns:a="http://schemas.openxmlformats.org/drawingml/2006/main" xmlns:r="http://schemas.openxmlformats.org/officeDocument/2006/relationships" xmlns:p="http://schemas.openxmlformats.org/presentationml/2006/main">
+  <p:cSld>
+    <p:spTree>
+      <p:nvGrpSpPr>
+        <p:cNvPr id="1" name=""/>
+        <p:cNvGrpSpPr/>
+        <p:nvPr/>
+      </p:nvGrpSpPr>
+      <p:grpSpPr>
+        <a:xfrm>
+          <a:off x="0" y="0"/>
+          <a:ext cx="0" cy="0"/>
+          <a:chOff x="0" y="0"/>
+          <a:chExt cx="0" cy="0"/>
+        </a:xfrm>
+      </p:grpSpPr>
+      <p:sp>
+        <p:nvSpPr>
+          <p:cNvPr id="2" name="Title 1">
+            <a:extLst>
+              <a:ext uri="{FF2B5EF4-FFF2-40B4-BE49-F238E27FC236}">
+                <a16:creationId xmlns:a16="http://schemas.microsoft.com/office/drawing/2014/main" id="{DD4299F1-D18C-ED8D-1EF1-E2042C474C45}"/>
+              </a:ext>
+            </a:extLst>
+          </p:cNvPr>
+          <p:cNvSpPr>
+            <a:spLocks noGrp="1"/>
+          </p:cNvSpPr>
+          <p:nvPr>
+            <p:ph type="title"/>
+          </p:nvPr>
+        </p:nvSpPr>
+        <p:spPr/>
+        <p:txBody>
+          <a:bodyPr/>
+          <a:lstStyle/>
+          <a:p>
+            <a:endParaRPr lang="en-SG"/>
+          </a:p>
+        </p:txBody>
+      </p:sp>
+      <p:sp>
+        <p:nvSpPr>
+          <p:cNvPr id="3" name="Content Placeholder 2">
+            <a:extLst>
+              <a:ext uri="{FF2B5EF4-FFF2-40B4-BE49-F238E27FC236}">
+                <a16:creationId xmlns:a16="http://schemas.microsoft.com/office/drawing/2014/main" id="{CF1D478A-0975-EE46-490C-B98DC55AC938}"/>
+              </a:ext>
+            </a:extLst>
+          </p:cNvPr>
+          <p:cNvSpPr>
+            <a:spLocks noGrp="1"/>
+          </p:cNvSpPr>
+          <p:nvPr>
+            <p:ph idx="1"/>
+          </p:nvPr>
+        </p:nvSpPr>
+        <p:spPr/>
+        <p:txBody>
+          <a:bodyPr/>
+          <a:lstStyle/>
+          <a:p>
+            <a:endParaRPr lang="en-SG"/>
+          </a:p>
+        </p:txBody>
+      </p:sp>
+    </p:spTree>
+    <p:extLst>
+      <p:ext uri="{BB962C8B-B14F-4D97-AF65-F5344CB8AC3E}">
+        <p14:creationId xmlns:p14="http://schemas.microsoft.com/office/powerpoint/2010/main" val="3163596145"/>
+      </p:ext>
+    </p:extLst>
+  </p:cSld>
+  <p:clrMapOvr>
+    <a:masterClrMapping/>
+  </p:clrMapOvr>
+</p:sld>
+</file>
+
+<file path=ppt/slides/slide29.xml><?xml version="1.0" encoding="utf-8"?>
+<p:sld xmlns:a="http://schemas.openxmlformats.org/drawingml/2006/main" xmlns:r="http://schemas.openxmlformats.org/officeDocument/2006/relationships" xmlns:p="http://schemas.openxmlformats.org/presentationml/2006/main">
+  <p:cSld>
+    <p:spTree>
+      <p:nvGrpSpPr>
+        <p:cNvPr id="1" name=""/>
+        <p:cNvGrpSpPr/>
+        <p:nvPr/>
+      </p:nvGrpSpPr>
+      <p:grpSpPr>
+        <a:xfrm>
+          <a:off x="0" y="0"/>
+          <a:ext cx="0" cy="0"/>
+          <a:chOff x="0" y="0"/>
+          <a:chExt cx="0" cy="0"/>
+        </a:xfrm>
+      </p:grpSpPr>
+      <p:sp>
+        <p:nvSpPr>
+          <p:cNvPr id="2" name="Title 1">
+            <a:extLst>
+              <a:ext uri="{FF2B5EF4-FFF2-40B4-BE49-F238E27FC236}">
+                <a16:creationId xmlns:a16="http://schemas.microsoft.com/office/drawing/2014/main" id="{6B379AFD-C750-A12B-B155-F8426594D91F}"/>
+              </a:ext>
+            </a:extLst>
+          </p:cNvPr>
+          <p:cNvSpPr>
+            <a:spLocks noGrp="1"/>
+          </p:cNvSpPr>
+          <p:nvPr>
+            <p:ph type="title"/>
+          </p:nvPr>
+        </p:nvSpPr>
+        <p:spPr/>
+        <p:txBody>
+          <a:bodyPr/>
+          <a:lstStyle/>
+          <a:p>
+            <a:endParaRPr lang="en-SG"/>
+          </a:p>
+        </p:txBody>
+      </p:sp>
+      <p:sp>
+        <p:nvSpPr>
+          <p:cNvPr id="3" name="Content Placeholder 2">
+            <a:extLst>
+              <a:ext uri="{FF2B5EF4-FFF2-40B4-BE49-F238E27FC236}">
+                <a16:creationId xmlns:a16="http://schemas.microsoft.com/office/drawing/2014/main" id="{593B6C32-2754-00A2-7A8E-EF46AD4E3535}"/>
+              </a:ext>
+            </a:extLst>
+          </p:cNvPr>
+          <p:cNvSpPr>
+            <a:spLocks noGrp="1"/>
+          </p:cNvSpPr>
+          <p:nvPr>
+            <p:ph idx="1"/>
+          </p:nvPr>
+        </p:nvSpPr>
+        <p:spPr/>
+        <p:txBody>
+          <a:bodyPr/>
+          <a:lstStyle/>
+          <a:p>
+            <a:endParaRPr lang="en-SG"/>
+          </a:p>
+        </p:txBody>
+      </p:sp>
+    </p:spTree>
+    <p:extLst>
+      <p:ext uri="{BB962C8B-B14F-4D97-AF65-F5344CB8AC3E}">
+        <p14:creationId xmlns:p14="http://schemas.microsoft.com/office/powerpoint/2010/main" val="101927766"/>
       </p:ext>
     </p:extLst>
   </p:cSld>
@@ -4994,6 +6973,86 @@
           <p:cNvPr id="2" name="Title 1">
             <a:extLst>
               <a:ext uri="{FF2B5EF4-FFF2-40B4-BE49-F238E27FC236}">
+                <a16:creationId xmlns:a16="http://schemas.microsoft.com/office/drawing/2014/main" id="{994AE3DB-EF76-E311-EBF2-7EA1ECA377EA}"/>
+              </a:ext>
+            </a:extLst>
+          </p:cNvPr>
+          <p:cNvSpPr>
+            <a:spLocks noGrp="1"/>
+          </p:cNvSpPr>
+          <p:nvPr>
+            <p:ph type="title"/>
+          </p:nvPr>
+        </p:nvSpPr>
+        <p:spPr/>
+        <p:txBody>
+          <a:bodyPr/>
+          <a:lstStyle/>
+          <a:p>
+            <a:endParaRPr lang="en-SG"/>
+          </a:p>
+        </p:txBody>
+      </p:sp>
+      <p:sp>
+        <p:nvSpPr>
+          <p:cNvPr id="3" name="Content Placeholder 2">
+            <a:extLst>
+              <a:ext uri="{FF2B5EF4-FFF2-40B4-BE49-F238E27FC236}">
+                <a16:creationId xmlns:a16="http://schemas.microsoft.com/office/drawing/2014/main" id="{65399E50-9E84-8D67-B55F-073C06C3D10E}"/>
+              </a:ext>
+            </a:extLst>
+          </p:cNvPr>
+          <p:cNvSpPr>
+            <a:spLocks noGrp="1"/>
+          </p:cNvSpPr>
+          <p:nvPr>
+            <p:ph idx="1"/>
+          </p:nvPr>
+        </p:nvSpPr>
+        <p:spPr/>
+        <p:txBody>
+          <a:bodyPr/>
+          <a:lstStyle/>
+          <a:p>
+            <a:endParaRPr lang="en-SG"/>
+          </a:p>
+        </p:txBody>
+      </p:sp>
+    </p:spTree>
+    <p:extLst>
+      <p:ext uri="{BB962C8B-B14F-4D97-AF65-F5344CB8AC3E}">
+        <p14:creationId xmlns:p14="http://schemas.microsoft.com/office/powerpoint/2010/main" val="380766058"/>
+      </p:ext>
+    </p:extLst>
+  </p:cSld>
+  <p:clrMapOvr>
+    <a:masterClrMapping/>
+  </p:clrMapOvr>
+</p:sld>
+</file>
+
+<file path=ppt/slides/slide30.xml><?xml version="1.0" encoding="utf-8"?>
+<p:sld xmlns:a="http://schemas.openxmlformats.org/drawingml/2006/main" xmlns:r="http://schemas.openxmlformats.org/officeDocument/2006/relationships" xmlns:p="http://schemas.openxmlformats.org/presentationml/2006/main">
+  <p:cSld>
+    <p:spTree>
+      <p:nvGrpSpPr>
+        <p:cNvPr id="1" name=""/>
+        <p:cNvGrpSpPr/>
+        <p:nvPr/>
+      </p:nvGrpSpPr>
+      <p:grpSpPr>
+        <a:xfrm>
+          <a:off x="0" y="0"/>
+          <a:ext cx="0" cy="0"/>
+          <a:chOff x="0" y="0"/>
+          <a:chExt cx="0" cy="0"/>
+        </a:xfrm>
+      </p:grpSpPr>
+      <p:sp>
+        <p:nvSpPr>
+          <p:cNvPr id="2" name="Title 1">
+            <a:extLst>
+              <a:ext uri="{FF2B5EF4-FFF2-40B4-BE49-F238E27FC236}">
                 <a16:creationId xmlns:a16="http://schemas.microsoft.com/office/drawing/2014/main" id="{11A08BA8-9DEC-4471-8590-434E8D8BB4A0}"/>
               </a:ext>
             </a:extLst>
@@ -5094,6 +7153,221 @@
     <p:extLst>
       <p:ext uri="{BB962C8B-B14F-4D97-AF65-F5344CB8AC3E}">
         <p14:creationId xmlns:p14="http://schemas.microsoft.com/office/powerpoint/2010/main" val="1036081419"/>
+      </p:ext>
+    </p:extLst>
+  </p:cSld>
+  <p:clrMapOvr>
+    <a:masterClrMapping/>
+  </p:clrMapOvr>
+</p:sld>
+</file>
+
+<file path=ppt/slides/slide31.xml><?xml version="1.0" encoding="utf-8"?>
+<p:sld xmlns:a="http://schemas.openxmlformats.org/drawingml/2006/main" xmlns:r="http://schemas.openxmlformats.org/officeDocument/2006/relationships" xmlns:p="http://schemas.openxmlformats.org/presentationml/2006/main">
+  <p:cSld>
+    <p:spTree>
+      <p:nvGrpSpPr>
+        <p:cNvPr id="1" name=""/>
+        <p:cNvGrpSpPr/>
+        <p:nvPr/>
+      </p:nvGrpSpPr>
+      <p:grpSpPr>
+        <a:xfrm>
+          <a:off x="0" y="0"/>
+          <a:ext cx="0" cy="0"/>
+          <a:chOff x="0" y="0"/>
+          <a:chExt cx="0" cy="0"/>
+        </a:xfrm>
+      </p:grpSpPr>
+      <p:sp>
+        <p:nvSpPr>
+          <p:cNvPr id="2" name="Title 1">
+            <a:extLst>
+              <a:ext uri="{FF2B5EF4-FFF2-40B4-BE49-F238E27FC236}">
+                <a16:creationId xmlns:a16="http://schemas.microsoft.com/office/drawing/2014/main" id="{F6E33F64-ACBF-414C-8E71-06E4F9517B15}"/>
+              </a:ext>
+            </a:extLst>
+          </p:cNvPr>
+          <p:cNvSpPr>
+            <a:spLocks noGrp="1"/>
+          </p:cNvSpPr>
+          <p:nvPr>
+            <p:ph type="title"/>
+          </p:nvPr>
+        </p:nvSpPr>
+        <p:spPr/>
+        <p:txBody>
+          <a:bodyPr/>
+          <a:lstStyle/>
+          <a:p>
+            <a:r>
+              <a:rPr lang="en-US" dirty="0"/>
+              <a:t>Learn more about these topics</a:t>
+            </a:r>
+            <a:endParaRPr lang="en-GB" dirty="0"/>
+          </a:p>
+        </p:txBody>
+      </p:sp>
+      <p:sp>
+        <p:nvSpPr>
+          <p:cNvPr id="3" name="Content Placeholder 2">
+            <a:extLst>
+              <a:ext uri="{FF2B5EF4-FFF2-40B4-BE49-F238E27FC236}">
+                <a16:creationId xmlns:a16="http://schemas.microsoft.com/office/drawing/2014/main" id="{C71C8DD6-14D1-44DF-9843-EFEDF44E39A2}"/>
+              </a:ext>
+            </a:extLst>
+          </p:cNvPr>
+          <p:cNvSpPr>
+            <a:spLocks noGrp="1"/>
+          </p:cNvSpPr>
+          <p:nvPr>
+            <p:ph idx="1"/>
+          </p:nvPr>
+        </p:nvSpPr>
+        <p:spPr>
+          <a:xfrm>
+            <a:off x="838200" y="1825624"/>
+            <a:ext cx="10515600" cy="5032375"/>
+          </a:xfrm>
+        </p:spPr>
+        <p:txBody>
+          <a:bodyPr>
+            <a:normAutofit/>
+          </a:bodyPr>
+          <a:lstStyle/>
+          <a:p>
+            <a:pPr marL="0" indent="0">
+              <a:buNone/>
+            </a:pPr>
+            <a:r>
+              <a:rPr lang="en-US" dirty="0"/>
+              <a:t>Out of class, supporting papers, for those of you who are curious.</a:t>
+            </a:r>
+          </a:p>
+          <a:p>
+            <a:endParaRPr lang="en-US" dirty="0"/>
+          </a:p>
+          <a:p>
+            <a:r>
+              <a:rPr lang="en-US" dirty="0"/>
+              <a:t>[XXX] XXX</a:t>
+            </a:r>
+          </a:p>
+          <a:p>
+            <a:endParaRPr lang="en-GB" dirty="0"/>
+          </a:p>
+        </p:txBody>
+      </p:sp>
+    </p:spTree>
+    <p:extLst>
+      <p:ext uri="{BB962C8B-B14F-4D97-AF65-F5344CB8AC3E}">
+        <p14:creationId xmlns:p14="http://schemas.microsoft.com/office/powerpoint/2010/main" val="3880949074"/>
+      </p:ext>
+    </p:extLst>
+  </p:cSld>
+  <p:clrMapOvr>
+    <a:masterClrMapping/>
+  </p:clrMapOvr>
+</p:sld>
+</file>
+
+<file path=ppt/slides/slide32.xml><?xml version="1.0" encoding="utf-8"?>
+<p:sld xmlns:a="http://schemas.openxmlformats.org/drawingml/2006/main" xmlns:r="http://schemas.openxmlformats.org/officeDocument/2006/relationships" xmlns:p="http://schemas.openxmlformats.org/presentationml/2006/main">
+  <p:cSld>
+    <p:spTree>
+      <p:nvGrpSpPr>
+        <p:cNvPr id="1" name=""/>
+        <p:cNvGrpSpPr/>
+        <p:nvPr/>
+      </p:nvGrpSpPr>
+      <p:grpSpPr>
+        <a:xfrm>
+          <a:off x="0" y="0"/>
+          <a:ext cx="0" cy="0"/>
+          <a:chOff x="0" y="0"/>
+          <a:chExt cx="0" cy="0"/>
+        </a:xfrm>
+      </p:grpSpPr>
+      <p:sp>
+        <p:nvSpPr>
+          <p:cNvPr id="2" name="Title 1">
+            <a:extLst>
+              <a:ext uri="{FF2B5EF4-FFF2-40B4-BE49-F238E27FC236}">
+                <a16:creationId xmlns:a16="http://schemas.microsoft.com/office/drawing/2014/main" id="{999B9715-ECD1-470D-B523-53C9DD5C7678}"/>
+              </a:ext>
+            </a:extLst>
+          </p:cNvPr>
+          <p:cNvSpPr>
+            <a:spLocks noGrp="1"/>
+          </p:cNvSpPr>
+          <p:nvPr>
+            <p:ph type="title"/>
+          </p:nvPr>
+        </p:nvSpPr>
+        <p:spPr/>
+        <p:txBody>
+          <a:bodyPr/>
+          <a:lstStyle/>
+          <a:p>
+            <a:r>
+              <a:rPr lang="en-US" dirty="0"/>
+              <a:t>Learn more about these topics</a:t>
+            </a:r>
+            <a:endParaRPr lang="en-GB" dirty="0"/>
+          </a:p>
+        </p:txBody>
+      </p:sp>
+      <p:sp>
+        <p:nvSpPr>
+          <p:cNvPr id="5" name="Content Placeholder 4">
+            <a:extLst>
+              <a:ext uri="{FF2B5EF4-FFF2-40B4-BE49-F238E27FC236}">
+                <a16:creationId xmlns:a16="http://schemas.microsoft.com/office/drawing/2014/main" id="{7D0CB248-82F3-414A-84E4-14EF63C7FB27}"/>
+              </a:ext>
+            </a:extLst>
+          </p:cNvPr>
+          <p:cNvSpPr>
+            <a:spLocks noGrp="1"/>
+          </p:cNvSpPr>
+          <p:nvPr>
+            <p:ph idx="1"/>
+          </p:nvPr>
+        </p:nvSpPr>
+        <p:spPr>
+          <a:xfrm>
+            <a:off x="838200" y="1825624"/>
+            <a:ext cx="10515600" cy="5032375"/>
+          </a:xfrm>
+        </p:spPr>
+        <p:txBody>
+          <a:bodyPr>
+            <a:normAutofit/>
+          </a:bodyPr>
+          <a:lstStyle/>
+          <a:p>
+            <a:pPr marL="0" indent="0">
+              <a:buNone/>
+            </a:pPr>
+            <a:r>
+              <a:rPr lang="en-GB" dirty="0"/>
+              <a:t>Some extra (easy) reading and videos for those of you who are curious.</a:t>
+            </a:r>
+          </a:p>
+          <a:p>
+            <a:r>
+              <a:rPr lang="en-GB" dirty="0"/>
+              <a:t>[XXX] XXX</a:t>
+            </a:r>
+          </a:p>
+          <a:p>
+            <a:endParaRPr lang="en-GB" dirty="0"/>
+          </a:p>
+        </p:txBody>
+      </p:sp>
+    </p:spTree>
+    <p:extLst>
+      <p:ext uri="{BB962C8B-B14F-4D97-AF65-F5344CB8AC3E}">
+        <p14:creationId xmlns:p14="http://schemas.microsoft.com/office/powerpoint/2010/main" val="1893873068"/>
       </p:ext>
     </p:extLst>
   </p:cSld>
@@ -5125,7 +7399,7 @@
           <p:cNvPr id="2" name="Title 1">
             <a:extLst>
               <a:ext uri="{FF2B5EF4-FFF2-40B4-BE49-F238E27FC236}">
-                <a16:creationId xmlns:a16="http://schemas.microsoft.com/office/drawing/2014/main" id="{F6E33F64-ACBF-414C-8E71-06E4F9517B15}"/>
+                <a16:creationId xmlns:a16="http://schemas.microsoft.com/office/drawing/2014/main" id="{8E8C2158-1B5F-49B1-EFBA-C654B2C7E327}"/>
               </a:ext>
             </a:extLst>
           </p:cNvPr>
@@ -5141,11 +7415,7 @@
           <a:bodyPr/>
           <a:lstStyle/>
           <a:p>
-            <a:r>
-              <a:rPr lang="en-US" dirty="0"/>
-              <a:t>Learn more about these topics</a:t>
-            </a:r>
-            <a:endParaRPr lang="en-GB" dirty="0"/>
+            <a:endParaRPr lang="en-SG"/>
           </a:p>
         </p:txBody>
       </p:sp>
@@ -5154,7 +7424,7 @@
           <p:cNvPr id="3" name="Content Placeholder 2">
             <a:extLst>
               <a:ext uri="{FF2B5EF4-FFF2-40B4-BE49-F238E27FC236}">
-                <a16:creationId xmlns:a16="http://schemas.microsoft.com/office/drawing/2014/main" id="{C71C8DD6-14D1-44DF-9843-EFEDF44E39A2}"/>
+                <a16:creationId xmlns:a16="http://schemas.microsoft.com/office/drawing/2014/main" id="{350410A3-AA46-4D57-BBE4-7C2245269B80}"/>
               </a:ext>
             </a:extLst>
           </p:cNvPr>
@@ -5165,44 +7435,19 @@
             <p:ph idx="1"/>
           </p:nvPr>
         </p:nvSpPr>
-        <p:spPr>
-          <a:xfrm>
-            <a:off x="838200" y="1825624"/>
-            <a:ext cx="10515600" cy="5032375"/>
-          </a:xfrm>
-        </p:spPr>
-        <p:txBody>
-          <a:bodyPr>
-            <a:normAutofit/>
-          </a:bodyPr>
-          <a:lstStyle/>
-          <a:p>
-            <a:pPr marL="0" indent="0">
-              <a:buNone/>
-            </a:pPr>
-            <a:r>
-              <a:rPr lang="en-US" dirty="0"/>
-              <a:t>Out of class, supporting papers, for those of you who are curious.</a:t>
-            </a:r>
-          </a:p>
-          <a:p>
-            <a:endParaRPr lang="en-US" dirty="0"/>
-          </a:p>
-          <a:p>
-            <a:r>
-              <a:rPr lang="en-US" dirty="0"/>
-              <a:t>[XXX] XXX</a:t>
-            </a:r>
-          </a:p>
-          <a:p>
-            <a:endParaRPr lang="en-GB" dirty="0"/>
+        <p:spPr/>
+        <p:txBody>
+          <a:bodyPr/>
+          <a:lstStyle/>
+          <a:p>
+            <a:endParaRPr lang="en-SG"/>
           </a:p>
         </p:txBody>
       </p:sp>
     </p:spTree>
     <p:extLst>
       <p:ext uri="{BB962C8B-B14F-4D97-AF65-F5344CB8AC3E}">
-        <p14:creationId xmlns:p14="http://schemas.microsoft.com/office/powerpoint/2010/main" val="3880949074"/>
+        <p14:creationId xmlns:p14="http://schemas.microsoft.com/office/powerpoint/2010/main" val="1970187575"/>
       </p:ext>
     </p:extLst>
   </p:cSld>
@@ -5234,7 +7479,7 @@
           <p:cNvPr id="2" name="Title 1">
             <a:extLst>
               <a:ext uri="{FF2B5EF4-FFF2-40B4-BE49-F238E27FC236}">
-                <a16:creationId xmlns:a16="http://schemas.microsoft.com/office/drawing/2014/main" id="{999B9715-ECD1-470D-B523-53C9DD5C7678}"/>
+                <a16:creationId xmlns:a16="http://schemas.microsoft.com/office/drawing/2014/main" id="{77126354-C35C-9E58-34D0-5861FBC9E6D5}"/>
               </a:ext>
             </a:extLst>
           </p:cNvPr>
@@ -5250,20 +7495,16 @@
           <a:bodyPr/>
           <a:lstStyle/>
           <a:p>
-            <a:r>
-              <a:rPr lang="en-US" dirty="0"/>
-              <a:t>Learn more about these topics</a:t>
-            </a:r>
-            <a:endParaRPr lang="en-GB" dirty="0"/>
-          </a:p>
-        </p:txBody>
-      </p:sp>
-      <p:sp>
-        <p:nvSpPr>
-          <p:cNvPr id="5" name="Content Placeholder 4">
-            <a:extLst>
-              <a:ext uri="{FF2B5EF4-FFF2-40B4-BE49-F238E27FC236}">
-                <a16:creationId xmlns:a16="http://schemas.microsoft.com/office/drawing/2014/main" id="{7D0CB248-82F3-414A-84E4-14EF63C7FB27}"/>
+            <a:endParaRPr lang="en-SG"/>
+          </a:p>
+        </p:txBody>
+      </p:sp>
+      <p:sp>
+        <p:nvSpPr>
+          <p:cNvPr id="3" name="Content Placeholder 2">
+            <a:extLst>
+              <a:ext uri="{FF2B5EF4-FFF2-40B4-BE49-F238E27FC236}">
+                <a16:creationId xmlns:a16="http://schemas.microsoft.com/office/drawing/2014/main" id="{AE633EF7-FE8D-5712-4111-81D6DAA3DCD5}"/>
               </a:ext>
             </a:extLst>
           </p:cNvPr>
@@ -5274,41 +7515,359 @@
             <p:ph idx="1"/>
           </p:nvPr>
         </p:nvSpPr>
-        <p:spPr>
-          <a:xfrm>
-            <a:off x="838200" y="1825624"/>
-            <a:ext cx="10515600" cy="5032375"/>
-          </a:xfrm>
-        </p:spPr>
-        <p:txBody>
-          <a:bodyPr>
-            <a:normAutofit/>
-          </a:bodyPr>
-          <a:lstStyle/>
-          <a:p>
-            <a:pPr marL="0" indent="0">
-              <a:buNone/>
-            </a:pPr>
-            <a:r>
-              <a:rPr lang="en-GB" dirty="0"/>
-              <a:t>Some extra (easy) reading and videos for those of you who are curious.</a:t>
-            </a:r>
-          </a:p>
-          <a:p>
-            <a:r>
-              <a:rPr lang="en-GB" dirty="0"/>
-              <a:t>[XXX] XXX</a:t>
-            </a:r>
-          </a:p>
-          <a:p>
-            <a:endParaRPr lang="en-GB" dirty="0"/>
+        <p:spPr/>
+        <p:txBody>
+          <a:bodyPr/>
+          <a:lstStyle/>
+          <a:p>
+            <a:endParaRPr lang="en-SG"/>
           </a:p>
         </p:txBody>
       </p:sp>
     </p:spTree>
     <p:extLst>
       <p:ext uri="{BB962C8B-B14F-4D97-AF65-F5344CB8AC3E}">
-        <p14:creationId xmlns:p14="http://schemas.microsoft.com/office/powerpoint/2010/main" val="1893873068"/>
+        <p14:creationId xmlns:p14="http://schemas.microsoft.com/office/powerpoint/2010/main" val="2100436947"/>
+      </p:ext>
+    </p:extLst>
+  </p:cSld>
+  <p:clrMapOvr>
+    <a:masterClrMapping/>
+  </p:clrMapOvr>
+</p:sld>
+</file>
+
+<file path=ppt/slides/slide6.xml><?xml version="1.0" encoding="utf-8"?>
+<p:sld xmlns:a="http://schemas.openxmlformats.org/drawingml/2006/main" xmlns:r="http://schemas.openxmlformats.org/officeDocument/2006/relationships" xmlns:p="http://schemas.openxmlformats.org/presentationml/2006/main">
+  <p:cSld>
+    <p:spTree>
+      <p:nvGrpSpPr>
+        <p:cNvPr id="1" name=""/>
+        <p:cNvGrpSpPr/>
+        <p:nvPr/>
+      </p:nvGrpSpPr>
+      <p:grpSpPr>
+        <a:xfrm>
+          <a:off x="0" y="0"/>
+          <a:ext cx="0" cy="0"/>
+          <a:chOff x="0" y="0"/>
+          <a:chExt cx="0" cy="0"/>
+        </a:xfrm>
+      </p:grpSpPr>
+      <p:sp>
+        <p:nvSpPr>
+          <p:cNvPr id="2" name="Title 1">
+            <a:extLst>
+              <a:ext uri="{FF2B5EF4-FFF2-40B4-BE49-F238E27FC236}">
+                <a16:creationId xmlns:a16="http://schemas.microsoft.com/office/drawing/2014/main" id="{D5C2C212-E261-A521-5A07-4F79BEE7D615}"/>
+              </a:ext>
+            </a:extLst>
+          </p:cNvPr>
+          <p:cNvSpPr>
+            <a:spLocks noGrp="1"/>
+          </p:cNvSpPr>
+          <p:nvPr>
+            <p:ph type="title"/>
+          </p:nvPr>
+        </p:nvSpPr>
+        <p:spPr/>
+        <p:txBody>
+          <a:bodyPr/>
+          <a:lstStyle/>
+          <a:p>
+            <a:endParaRPr lang="en-SG"/>
+          </a:p>
+        </p:txBody>
+      </p:sp>
+      <p:sp>
+        <p:nvSpPr>
+          <p:cNvPr id="3" name="Content Placeholder 2">
+            <a:extLst>
+              <a:ext uri="{FF2B5EF4-FFF2-40B4-BE49-F238E27FC236}">
+                <a16:creationId xmlns:a16="http://schemas.microsoft.com/office/drawing/2014/main" id="{EB875A09-F649-0453-782D-77AD08503234}"/>
+              </a:ext>
+            </a:extLst>
+          </p:cNvPr>
+          <p:cNvSpPr>
+            <a:spLocks noGrp="1"/>
+          </p:cNvSpPr>
+          <p:nvPr>
+            <p:ph idx="1"/>
+          </p:nvPr>
+        </p:nvSpPr>
+        <p:spPr/>
+        <p:txBody>
+          <a:bodyPr/>
+          <a:lstStyle/>
+          <a:p>
+            <a:endParaRPr lang="en-SG"/>
+          </a:p>
+        </p:txBody>
+      </p:sp>
+    </p:spTree>
+    <p:extLst>
+      <p:ext uri="{BB962C8B-B14F-4D97-AF65-F5344CB8AC3E}">
+        <p14:creationId xmlns:p14="http://schemas.microsoft.com/office/powerpoint/2010/main" val="3251402422"/>
+      </p:ext>
+    </p:extLst>
+  </p:cSld>
+  <p:clrMapOvr>
+    <a:masterClrMapping/>
+  </p:clrMapOvr>
+</p:sld>
+</file>
+
+<file path=ppt/slides/slide7.xml><?xml version="1.0" encoding="utf-8"?>
+<p:sld xmlns:a="http://schemas.openxmlformats.org/drawingml/2006/main" xmlns:r="http://schemas.openxmlformats.org/officeDocument/2006/relationships" xmlns:p="http://schemas.openxmlformats.org/presentationml/2006/main">
+  <p:cSld>
+    <p:spTree>
+      <p:nvGrpSpPr>
+        <p:cNvPr id="1" name=""/>
+        <p:cNvGrpSpPr/>
+        <p:nvPr/>
+      </p:nvGrpSpPr>
+      <p:grpSpPr>
+        <a:xfrm>
+          <a:off x="0" y="0"/>
+          <a:ext cx="0" cy="0"/>
+          <a:chOff x="0" y="0"/>
+          <a:chExt cx="0" cy="0"/>
+        </a:xfrm>
+      </p:grpSpPr>
+      <p:sp>
+        <p:nvSpPr>
+          <p:cNvPr id="2" name="Title 1">
+            <a:extLst>
+              <a:ext uri="{FF2B5EF4-FFF2-40B4-BE49-F238E27FC236}">
+                <a16:creationId xmlns:a16="http://schemas.microsoft.com/office/drawing/2014/main" id="{C3F2713C-FE07-816E-6FFD-E2674D11721D}"/>
+              </a:ext>
+            </a:extLst>
+          </p:cNvPr>
+          <p:cNvSpPr>
+            <a:spLocks noGrp="1"/>
+          </p:cNvSpPr>
+          <p:nvPr>
+            <p:ph type="title"/>
+          </p:nvPr>
+        </p:nvSpPr>
+        <p:spPr/>
+        <p:txBody>
+          <a:bodyPr/>
+          <a:lstStyle/>
+          <a:p>
+            <a:endParaRPr lang="en-SG"/>
+          </a:p>
+        </p:txBody>
+      </p:sp>
+      <p:sp>
+        <p:nvSpPr>
+          <p:cNvPr id="3" name="Content Placeholder 2">
+            <a:extLst>
+              <a:ext uri="{FF2B5EF4-FFF2-40B4-BE49-F238E27FC236}">
+                <a16:creationId xmlns:a16="http://schemas.microsoft.com/office/drawing/2014/main" id="{FA1F1CE6-06FF-6DD6-265C-39A26CC7DB57}"/>
+              </a:ext>
+            </a:extLst>
+          </p:cNvPr>
+          <p:cNvSpPr>
+            <a:spLocks noGrp="1"/>
+          </p:cNvSpPr>
+          <p:nvPr>
+            <p:ph idx="1"/>
+          </p:nvPr>
+        </p:nvSpPr>
+        <p:spPr/>
+        <p:txBody>
+          <a:bodyPr/>
+          <a:lstStyle/>
+          <a:p>
+            <a:endParaRPr lang="en-SG"/>
+          </a:p>
+        </p:txBody>
+      </p:sp>
+    </p:spTree>
+    <p:extLst>
+      <p:ext uri="{BB962C8B-B14F-4D97-AF65-F5344CB8AC3E}">
+        <p14:creationId xmlns:p14="http://schemas.microsoft.com/office/powerpoint/2010/main" val="1017635827"/>
+      </p:ext>
+    </p:extLst>
+  </p:cSld>
+  <p:clrMapOvr>
+    <a:masterClrMapping/>
+  </p:clrMapOvr>
+</p:sld>
+</file>
+
+<file path=ppt/slides/slide8.xml><?xml version="1.0" encoding="utf-8"?>
+<p:sld xmlns:a="http://schemas.openxmlformats.org/drawingml/2006/main" xmlns:r="http://schemas.openxmlformats.org/officeDocument/2006/relationships" xmlns:p="http://schemas.openxmlformats.org/presentationml/2006/main">
+  <p:cSld>
+    <p:spTree>
+      <p:nvGrpSpPr>
+        <p:cNvPr id="1" name=""/>
+        <p:cNvGrpSpPr/>
+        <p:nvPr/>
+      </p:nvGrpSpPr>
+      <p:grpSpPr>
+        <a:xfrm>
+          <a:off x="0" y="0"/>
+          <a:ext cx="0" cy="0"/>
+          <a:chOff x="0" y="0"/>
+          <a:chExt cx="0" cy="0"/>
+        </a:xfrm>
+      </p:grpSpPr>
+      <p:sp>
+        <p:nvSpPr>
+          <p:cNvPr id="2" name="Title 1">
+            <a:extLst>
+              <a:ext uri="{FF2B5EF4-FFF2-40B4-BE49-F238E27FC236}">
+                <a16:creationId xmlns:a16="http://schemas.microsoft.com/office/drawing/2014/main" id="{581B7E6E-252F-1AB6-6445-27D0020E0280}"/>
+              </a:ext>
+            </a:extLst>
+          </p:cNvPr>
+          <p:cNvSpPr>
+            <a:spLocks noGrp="1"/>
+          </p:cNvSpPr>
+          <p:nvPr>
+            <p:ph type="title"/>
+          </p:nvPr>
+        </p:nvSpPr>
+        <p:spPr/>
+        <p:txBody>
+          <a:bodyPr/>
+          <a:lstStyle/>
+          <a:p>
+            <a:endParaRPr lang="en-SG"/>
+          </a:p>
+        </p:txBody>
+      </p:sp>
+      <p:sp>
+        <p:nvSpPr>
+          <p:cNvPr id="3" name="Content Placeholder 2">
+            <a:extLst>
+              <a:ext uri="{FF2B5EF4-FFF2-40B4-BE49-F238E27FC236}">
+                <a16:creationId xmlns:a16="http://schemas.microsoft.com/office/drawing/2014/main" id="{088657BF-BB53-D488-1F2B-77F25EDE3A56}"/>
+              </a:ext>
+            </a:extLst>
+          </p:cNvPr>
+          <p:cNvSpPr>
+            <a:spLocks noGrp="1"/>
+          </p:cNvSpPr>
+          <p:nvPr>
+            <p:ph idx="1"/>
+          </p:nvPr>
+        </p:nvSpPr>
+        <p:spPr/>
+        <p:txBody>
+          <a:bodyPr/>
+          <a:lstStyle/>
+          <a:p>
+            <a:endParaRPr lang="en-SG"/>
+          </a:p>
+        </p:txBody>
+      </p:sp>
+    </p:spTree>
+    <p:extLst>
+      <p:ext uri="{BB962C8B-B14F-4D97-AF65-F5344CB8AC3E}">
+        <p14:creationId xmlns:p14="http://schemas.microsoft.com/office/powerpoint/2010/main" val="3140288791"/>
+      </p:ext>
+    </p:extLst>
+  </p:cSld>
+  <p:clrMapOvr>
+    <a:masterClrMapping/>
+  </p:clrMapOvr>
+</p:sld>
+</file>
+
+<file path=ppt/slides/slide9.xml><?xml version="1.0" encoding="utf-8"?>
+<p:sld xmlns:a="http://schemas.openxmlformats.org/drawingml/2006/main" xmlns:r="http://schemas.openxmlformats.org/officeDocument/2006/relationships" xmlns:p="http://schemas.openxmlformats.org/presentationml/2006/main">
+  <p:cSld>
+    <p:spTree>
+      <p:nvGrpSpPr>
+        <p:cNvPr id="1" name=""/>
+        <p:cNvGrpSpPr/>
+        <p:nvPr/>
+      </p:nvGrpSpPr>
+      <p:grpSpPr>
+        <a:xfrm>
+          <a:off x="0" y="0"/>
+          <a:ext cx="0" cy="0"/>
+          <a:chOff x="0" y="0"/>
+          <a:chExt cx="0" cy="0"/>
+        </a:xfrm>
+      </p:grpSpPr>
+      <p:sp>
+        <p:nvSpPr>
+          <p:cNvPr id="2" name="Title 1">
+            <a:extLst>
+              <a:ext uri="{FF2B5EF4-FFF2-40B4-BE49-F238E27FC236}">
+                <a16:creationId xmlns:a16="http://schemas.microsoft.com/office/drawing/2014/main" id="{FBC36228-8F7A-1389-12CE-514215337F1A}"/>
+              </a:ext>
+            </a:extLst>
+          </p:cNvPr>
+          <p:cNvSpPr>
+            <a:spLocks noGrp="1"/>
+          </p:cNvSpPr>
+          <p:nvPr>
+            <p:ph type="title"/>
+          </p:nvPr>
+        </p:nvSpPr>
+        <p:spPr/>
+        <p:txBody>
+          <a:bodyPr/>
+          <a:lstStyle/>
+          <a:p>
+            <a:r>
+              <a:rPr lang="en-GB" dirty="0"/>
+              <a:t>Class, </a:t>
+            </a:r>
+            <a:r>
+              <a:rPr lang="en-GB" dirty="0" err="1"/>
+              <a:t>nn.module</a:t>
+            </a:r>
+            <a:r>
+              <a:rPr lang="en-GB" dirty="0"/>
+              <a:t>, </a:t>
+            </a:r>
+            <a:r>
+              <a:rPr lang="en-GB" dirty="0" err="1"/>
+              <a:t>init</a:t>
+            </a:r>
+            <a:r>
+              <a:rPr lang="en-GB" dirty="0"/>
+              <a:t>, retain grad</a:t>
+            </a:r>
+            <a:endParaRPr lang="en-SG" dirty="0"/>
+          </a:p>
+        </p:txBody>
+      </p:sp>
+      <p:sp>
+        <p:nvSpPr>
+          <p:cNvPr id="3" name="Content Placeholder 2">
+            <a:extLst>
+              <a:ext uri="{FF2B5EF4-FFF2-40B4-BE49-F238E27FC236}">
+                <a16:creationId xmlns:a16="http://schemas.microsoft.com/office/drawing/2014/main" id="{4E3EB5A2-1EBE-6555-85E5-4CA6DEF3845D}"/>
+              </a:ext>
+            </a:extLst>
+          </p:cNvPr>
+          <p:cNvSpPr>
+            <a:spLocks noGrp="1"/>
+          </p:cNvSpPr>
+          <p:nvPr>
+            <p:ph idx="1"/>
+          </p:nvPr>
+        </p:nvSpPr>
+        <p:spPr/>
+        <p:txBody>
+          <a:bodyPr/>
+          <a:lstStyle/>
+          <a:p>
+            <a:endParaRPr lang="en-SG"/>
+          </a:p>
+        </p:txBody>
+      </p:sp>
+    </p:spTree>
+    <p:extLst>
+      <p:ext uri="{BB962C8B-B14F-4D97-AF65-F5344CB8AC3E}">
+        <p14:creationId xmlns:p14="http://schemas.microsoft.com/office/powerpoint/2010/main" val="1921397945"/>
       </p:ext>
     </p:extLst>
   </p:cSld>

</xml_diff>